<commit_message>
ppt: add page number
</commit_message>
<xml_diff>
--- a/Project1_presentation.pptx
+++ b/Project1_presentation.pptx
@@ -7,6 +7,9 @@
   <p:notesMasterIdLst>
     <p:notesMasterId r:id="rId42"/>
   </p:notesMasterIdLst>
+  <p:handoutMasterIdLst>
+    <p:handoutMasterId r:id="rId43"/>
+  </p:handoutMasterIdLst>
   <p:sldIdLst>
     <p:sldId id="256" r:id="rId2"/>
     <p:sldId id="279" r:id="rId3"/>
@@ -154,6 +157,195 @@
 </p:presentation>
 </file>
 
+<file path=ppt/handoutMasters/handoutMaster1.xml><?xml version="1.0" encoding="utf-8"?>
+<p:handoutMaster xmlns:a="http://schemas.openxmlformats.org/drawingml/2006/main" xmlns:r="http://schemas.openxmlformats.org/officeDocument/2006/relationships" xmlns:p="http://schemas.openxmlformats.org/presentationml/2006/main">
+  <p:cSld>
+    <p:bg>
+      <p:bgRef idx="1001">
+        <a:schemeClr val="bg1"/>
+      </p:bgRef>
+    </p:bg>
+    <p:spTree>
+      <p:nvGrpSpPr>
+        <p:cNvPr id="1" name=""/>
+        <p:cNvGrpSpPr/>
+        <p:nvPr/>
+      </p:nvGrpSpPr>
+      <p:grpSpPr>
+        <a:xfrm>
+          <a:off x="0" y="0"/>
+          <a:ext cx="0" cy="0"/>
+          <a:chOff x="0" y="0"/>
+          <a:chExt cx="0" cy="0"/>
+        </a:xfrm>
+      </p:grpSpPr>
+      <p:sp>
+        <p:nvSpPr>
+          <p:cNvPr id="2" name="页眉占位符 1">
+            <a:extLst>
+              <a:ext uri="{FF2B5EF4-FFF2-40B4-BE49-F238E27FC236}">
+                <a16:creationId xmlns:a16="http://schemas.microsoft.com/office/drawing/2014/main" id="{3AE44367-B0BE-56B4-B6B2-05FB1064004A}"/>
+              </a:ext>
+            </a:extLst>
+          </p:cNvPr>
+          <p:cNvSpPr>
+            <a:spLocks noGrp="1"/>
+          </p:cNvSpPr>
+          <p:nvPr>
+            <p:ph type="hdr" sz="quarter"/>
+          </p:nvPr>
+        </p:nvSpPr>
+        <p:spPr>
+          <a:xfrm>
+            <a:off x="0" y="0"/>
+            <a:ext cx="2971800" cy="458788"/>
+          </a:xfrm>
+          <a:prstGeom prst="rect">
+            <a:avLst/>
+          </a:prstGeom>
+        </p:spPr>
+        <p:txBody>
+          <a:bodyPr vert="horz" lIns="91440" tIns="45720" rIns="91440" bIns="45720" rtlCol="0"/>
+          <a:lstStyle>
+            <a:lvl1pPr algn="l">
+              <a:defRPr sz="1200"/>
+            </a:lvl1pPr>
+          </a:lstStyle>
+          <a:p>
+            <a:endParaRPr lang="zh-CN" altLang="en-US"/>
+          </a:p>
+        </p:txBody>
+      </p:sp>
+      <p:sp>
+        <p:nvSpPr>
+          <p:cNvPr id="3" name="日期占位符 2">
+            <a:extLst>
+              <a:ext uri="{FF2B5EF4-FFF2-40B4-BE49-F238E27FC236}">
+                <a16:creationId xmlns:a16="http://schemas.microsoft.com/office/drawing/2014/main" id="{FEC56D23-B4FE-F260-A5CA-41F831404EEA}"/>
+              </a:ext>
+            </a:extLst>
+          </p:cNvPr>
+          <p:cNvSpPr>
+            <a:spLocks noGrp="1"/>
+          </p:cNvSpPr>
+          <p:nvPr>
+            <p:ph type="dt" sz="quarter" idx="1"/>
+          </p:nvPr>
+        </p:nvSpPr>
+        <p:spPr>
+          <a:xfrm>
+            <a:off x="3884613" y="0"/>
+            <a:ext cx="2971800" cy="458788"/>
+          </a:xfrm>
+          <a:prstGeom prst="rect">
+            <a:avLst/>
+          </a:prstGeom>
+        </p:spPr>
+        <p:txBody>
+          <a:bodyPr vert="horz" lIns="91440" tIns="45720" rIns="91440" bIns="45720" rtlCol="0"/>
+          <a:lstStyle>
+            <a:lvl1pPr algn="r">
+              <a:defRPr sz="1200"/>
+            </a:lvl1pPr>
+          </a:lstStyle>
+          <a:p>
+            <a:fld id="{FA9A93AB-AA55-4F78-B598-59EBC888DF2F}" type="datetimeFigureOut">
+              <a:rPr lang="zh-CN" altLang="en-US" smtClean="0"/>
+              <a:t>2024/2/19</a:t>
+            </a:fld>
+            <a:endParaRPr lang="zh-CN" altLang="en-US"/>
+          </a:p>
+        </p:txBody>
+      </p:sp>
+      <p:sp>
+        <p:nvSpPr>
+          <p:cNvPr id="4" name="页脚占位符 3">
+            <a:extLst>
+              <a:ext uri="{FF2B5EF4-FFF2-40B4-BE49-F238E27FC236}">
+                <a16:creationId xmlns:a16="http://schemas.microsoft.com/office/drawing/2014/main" id="{CC098174-601E-0DFE-155D-89DE31309FDA}"/>
+              </a:ext>
+            </a:extLst>
+          </p:cNvPr>
+          <p:cNvSpPr>
+            <a:spLocks noGrp="1"/>
+          </p:cNvSpPr>
+          <p:nvPr>
+            <p:ph type="ftr" sz="quarter" idx="2"/>
+          </p:nvPr>
+        </p:nvSpPr>
+        <p:spPr>
+          <a:xfrm>
+            <a:off x="0" y="8685213"/>
+            <a:ext cx="2971800" cy="458787"/>
+          </a:xfrm>
+          <a:prstGeom prst="rect">
+            <a:avLst/>
+          </a:prstGeom>
+        </p:spPr>
+        <p:txBody>
+          <a:bodyPr vert="horz" lIns="91440" tIns="45720" rIns="91440" bIns="45720" rtlCol="0" anchor="b"/>
+          <a:lstStyle>
+            <a:lvl1pPr algn="l">
+              <a:defRPr sz="1200"/>
+            </a:lvl1pPr>
+          </a:lstStyle>
+          <a:p>
+            <a:endParaRPr lang="zh-CN" altLang="en-US"/>
+          </a:p>
+        </p:txBody>
+      </p:sp>
+      <p:sp>
+        <p:nvSpPr>
+          <p:cNvPr id="5" name="灯片编号占位符 4">
+            <a:extLst>
+              <a:ext uri="{FF2B5EF4-FFF2-40B4-BE49-F238E27FC236}">
+                <a16:creationId xmlns:a16="http://schemas.microsoft.com/office/drawing/2014/main" id="{BCBAC1CE-6155-37D6-7971-378B16421CA3}"/>
+              </a:ext>
+            </a:extLst>
+          </p:cNvPr>
+          <p:cNvSpPr>
+            <a:spLocks noGrp="1"/>
+          </p:cNvSpPr>
+          <p:nvPr>
+            <p:ph type="sldNum" sz="quarter" idx="3"/>
+          </p:nvPr>
+        </p:nvSpPr>
+        <p:spPr>
+          <a:xfrm>
+            <a:off x="3884613" y="8685213"/>
+            <a:ext cx="2971800" cy="458787"/>
+          </a:xfrm>
+          <a:prstGeom prst="rect">
+            <a:avLst/>
+          </a:prstGeom>
+        </p:spPr>
+        <p:txBody>
+          <a:bodyPr vert="horz" lIns="91440" tIns="45720" rIns="91440" bIns="45720" rtlCol="0" anchor="b"/>
+          <a:lstStyle>
+            <a:lvl1pPr algn="r">
+              <a:defRPr sz="1200"/>
+            </a:lvl1pPr>
+          </a:lstStyle>
+          <a:p>
+            <a:fld id="{BF7250BA-A13B-42F6-8AE2-1FFBA3DF7E5D}" type="slidenum">
+              <a:rPr lang="zh-CN" altLang="en-US" smtClean="0"/>
+              <a:t>‹#›</a:t>
+            </a:fld>
+            <a:endParaRPr lang="zh-CN" altLang="en-US"/>
+          </a:p>
+        </p:txBody>
+      </p:sp>
+    </p:spTree>
+    <p:extLst>
+      <p:ext uri="{BB962C8B-B14F-4D97-AF65-F5344CB8AC3E}">
+        <p14:creationId xmlns:p14="http://schemas.microsoft.com/office/powerpoint/2010/main" val="2126481130"/>
+      </p:ext>
+    </p:extLst>
+  </p:cSld>
+  <p:clrMap bg1="lt1" tx1="dk1" bg2="lt2" tx2="dk2" accent1="accent1" accent2="accent2" accent3="accent3" accent4="accent4" accent5="accent5" accent6="accent6" hlink="hlink" folHlink="folHlink"/>
+</p:handoutMaster>
+</file>
+
 <file path=ppt/notesMasters/notesMaster1.xml><?xml version="1.0" encoding="utf-8"?>
 <p:notesMaster xmlns:a="http://schemas.openxmlformats.org/drawingml/2006/main" xmlns:r="http://schemas.openxmlformats.org/officeDocument/2006/relationships" xmlns:p="http://schemas.openxmlformats.org/presentationml/2006/main">
   <p:cSld>
@@ -236,7 +428,7 @@
           <a:p>
             <a:fld id="{A55F5AD1-FA3F-4C5F-98AB-C071D219CF0E}" type="datetimeFigureOut">
               <a:rPr lang="zh-CN" altLang="en-US" smtClean="0"/>
-              <a:t>2024/2/18</a:t>
+              <a:t>2024/2/19</a:t>
             </a:fld>
             <a:endParaRPr lang="zh-CN" altLang="en-US"/>
           </a:p>
@@ -2159,9 +2351,9 @@
           <a:bodyPr/>
           <a:lstStyle/>
           <a:p>
-            <a:fld id="{62D6E202-B606-4609-B914-27C9371A1F6D}" type="datetime1">
-              <a:rPr lang="en-US" smtClean="0"/>
-              <a:t>2/18/2024</a:t>
+            <a:fld id="{27FE033D-8849-49FD-AB53-04D9ABC873EA}" type="datetime1">
+              <a:rPr lang="en-US" altLang="zh-CN" smtClean="0"/>
+              <a:t>2/19/2024</a:t>
             </a:fld>
             <a:endParaRPr lang="en-US" dirty="0"/>
           </a:p>
@@ -2394,7 +2586,6 @@
   <p:clrMapOvr>
     <a:masterClrMapping/>
   </p:clrMapOvr>
-  <p:hf sldNum="0" hdr="0" ftr="0" dt="0"/>
 </p:sldLayout>
 </file>
 
@@ -2596,9 +2787,9 @@
           <a:bodyPr/>
           <a:lstStyle/>
           <a:p>
-            <a:fld id="{62D6E202-B606-4609-B914-27C9371A1F6D}" type="datetime1">
-              <a:rPr lang="en-US" smtClean="0"/>
-              <a:t>2/18/2024</a:t>
+            <a:fld id="{4694EFB5-97BD-4B76-A3EC-E55E63A39530}" type="datetime1">
+              <a:rPr lang="en-US" altLang="zh-CN" smtClean="0"/>
+              <a:t>2/19/2024</a:t>
             </a:fld>
             <a:endParaRPr lang="en-US" dirty="0"/>
           </a:p>
@@ -2656,7 +2847,6 @@
   <p:clrMapOvr>
     <a:masterClrMapping/>
   </p:clrMapOvr>
-  <p:hf sldNum="0" hdr="0" ftr="0" dt="0"/>
 </p:sldLayout>
 </file>
 
@@ -2847,9 +3037,9 @@
           <a:bodyPr/>
           <a:lstStyle/>
           <a:p>
-            <a:fld id="{62D6E202-B606-4609-B914-27C9371A1F6D}" type="datetime1">
-              <a:rPr lang="en-US" smtClean="0"/>
-              <a:t>2/18/2024</a:t>
+            <a:fld id="{4764F797-9C4C-4DF3-8421-9E04DE0FC953}" type="datetime1">
+              <a:rPr lang="en-US" altLang="zh-CN" smtClean="0"/>
+              <a:t>2/19/2024</a:t>
             </a:fld>
             <a:endParaRPr lang="en-US" dirty="0"/>
           </a:p>
@@ -2907,7 +3097,6 @@
   <p:clrMapOvr>
     <a:masterClrMapping/>
   </p:clrMapOvr>
-  <p:hf sldNum="0" hdr="0" ftr="0" dt="0"/>
 </p:sldLayout>
 </file>
 
@@ -3156,9 +3345,9 @@
           <a:bodyPr/>
           <a:lstStyle/>
           <a:p>
-            <a:fld id="{62D6E202-B606-4609-B914-27C9371A1F6D}" type="datetime1">
-              <a:rPr lang="en-US" smtClean="0"/>
-              <a:t>2/18/2024</a:t>
+            <a:fld id="{762500A0-FB81-4CC3-ABC9-B88411968DD2}" type="datetime1">
+              <a:rPr lang="en-US" altLang="zh-CN" smtClean="0"/>
+              <a:t>2/19/2024</a:t>
             </a:fld>
             <a:endParaRPr lang="en-US" dirty="0"/>
           </a:p>
@@ -3284,7 +3473,6 @@
   <p:clrMapOvr>
     <a:masterClrMapping/>
   </p:clrMapOvr>
-  <p:hf sldNum="0" hdr="0" ftr="0" dt="0"/>
 </p:sldLayout>
 </file>
 
@@ -3475,9 +3663,9 @@
           <a:bodyPr/>
           <a:lstStyle/>
           <a:p>
-            <a:fld id="{62D6E202-B606-4609-B914-27C9371A1F6D}" type="datetime1">
-              <a:rPr lang="en-US" smtClean="0"/>
-              <a:t>2/18/2024</a:t>
+            <a:fld id="{F0DA365B-8C17-4BE0-9B38-7B31734367EE}" type="datetime1">
+              <a:rPr lang="en-US" altLang="zh-CN" smtClean="0"/>
+              <a:t>2/19/2024</a:t>
             </a:fld>
             <a:endParaRPr lang="en-US" dirty="0"/>
           </a:p>
@@ -3535,7 +3723,6 @@
   <p:clrMapOvr>
     <a:masterClrMapping/>
   </p:clrMapOvr>
-  <p:hf sldNum="0" hdr="0" ftr="0" dt="0"/>
 </p:sldLayout>
 </file>
 
@@ -3778,9 +3965,9 @@
           <a:bodyPr/>
           <a:lstStyle/>
           <a:p>
-            <a:fld id="{62D6E202-B606-4609-B914-27C9371A1F6D}" type="datetime1">
-              <a:rPr lang="en-US" smtClean="0"/>
-              <a:t>2/18/2024</a:t>
+            <a:fld id="{B3C28C5F-A394-4334-88A2-165176C5A5D5}" type="datetime1">
+              <a:rPr lang="en-US" altLang="zh-CN" smtClean="0"/>
+              <a:t>2/19/2024</a:t>
             </a:fld>
             <a:endParaRPr lang="en-US" dirty="0"/>
           </a:p>
@@ -3906,7 +4093,6 @@
   <p:clrMapOvr>
     <a:masterClrMapping/>
   </p:clrMapOvr>
-  <p:hf sldNum="0" hdr="0" ftr="0" dt="0"/>
 </p:sldLayout>
 </file>
 
@@ -4146,9 +4332,9 @@
           <a:bodyPr/>
           <a:lstStyle/>
           <a:p>
-            <a:fld id="{62D6E202-B606-4609-B914-27C9371A1F6D}" type="datetime1">
-              <a:rPr lang="en-US" smtClean="0"/>
-              <a:t>2/18/2024</a:t>
+            <a:fld id="{B4CC62F4-360B-4ED8-B696-A4F992C82B5A}" type="datetime1">
+              <a:rPr lang="en-US" altLang="zh-CN" smtClean="0"/>
+              <a:t>2/19/2024</a:t>
             </a:fld>
             <a:endParaRPr lang="en-US" dirty="0"/>
           </a:p>
@@ -4206,7 +4392,6 @@
   <p:clrMapOvr>
     <a:masterClrMapping/>
   </p:clrMapOvr>
-  <p:hf sldNum="0" hdr="0" ftr="0" dt="0"/>
 </p:sldLayout>
 </file>
 
@@ -4321,9 +4506,9 @@
           <a:bodyPr/>
           <a:lstStyle/>
           <a:p>
-            <a:fld id="{62D6E202-B606-4609-B914-27C9371A1F6D}" type="datetime1">
-              <a:rPr lang="en-US" smtClean="0"/>
-              <a:t>2/18/2024</a:t>
+            <a:fld id="{F95CB2F1-3398-42D2-B77A-D357C2B91990}" type="datetime1">
+              <a:rPr lang="en-US" altLang="zh-CN" smtClean="0"/>
+              <a:t>2/19/2024</a:t>
             </a:fld>
             <a:endParaRPr lang="en-US" dirty="0"/>
           </a:p>
@@ -4381,7 +4566,6 @@
   <p:clrMapOvr>
     <a:masterClrMapping/>
   </p:clrMapOvr>
-  <p:hf sldNum="0" hdr="0" ftr="0" dt="0"/>
 </p:sldLayout>
 </file>
 
@@ -4502,9 +4686,9 @@
           <a:bodyPr/>
           <a:lstStyle/>
           <a:p>
-            <a:fld id="{62D6E202-B606-4609-B914-27C9371A1F6D}" type="datetime1">
-              <a:rPr lang="en-US" smtClean="0"/>
-              <a:t>2/18/2024</a:t>
+            <a:fld id="{68BC0DC9-B651-47B4-91FC-AFCF08D8FC10}" type="datetime1">
+              <a:rPr lang="en-US" altLang="zh-CN" smtClean="0"/>
+              <a:t>2/19/2024</a:t>
             </a:fld>
             <a:endParaRPr lang="en-US" dirty="0"/>
           </a:p>
@@ -4562,7 +4746,6 @@
   <p:clrMapOvr>
     <a:masterClrMapping/>
   </p:clrMapOvr>
-  <p:hf sldNum="0" hdr="0" ftr="0" dt="0"/>
 </p:sldLayout>
 </file>
 
@@ -5072,9 +5255,9 @@
           <a:bodyPr/>
           <a:lstStyle/>
           <a:p>
-            <a:fld id="{62D6E202-B606-4609-B914-27C9371A1F6D}" type="datetime1">
-              <a:rPr lang="en-US" smtClean="0"/>
-              <a:t>2/18/2024</a:t>
+            <a:fld id="{4E386AFD-D819-46E7-98A2-332EA181CF00}" type="datetime1">
+              <a:rPr lang="en-US" altLang="zh-CN" smtClean="0"/>
+              <a:t>2/19/2024</a:t>
             </a:fld>
             <a:endParaRPr lang="en-US" dirty="0"/>
           </a:p>
@@ -5112,10 +5295,19 @@
         <p:spPr/>
         <p:txBody>
           <a:bodyPr/>
-          <a:lstStyle/>
+          <a:lstStyle>
+            <a:lvl1pPr>
+              <a:defRPr b="1" i="0" baseline="0">
+                <a:solidFill>
+                  <a:schemeClr val="tx1"/>
+                </a:solidFill>
+              </a:defRPr>
+            </a:lvl1pPr>
+          </a:lstStyle>
           <a:p>
             <a:fld id="{3A98EE3D-8CD1-4C3F-BD1C-C98C9596463C}" type="slidenum">
               <a:rPr lang="en-US" smtClean="0"/>
+              <a:pPr/>
               <a:t>‹#›</a:t>
             </a:fld>
             <a:endParaRPr lang="en-US" dirty="0"/>
@@ -5132,7 +5324,6 @@
   <p:clrMapOvr>
     <a:masterClrMapping/>
   </p:clrMapOvr>
-  <p:hf sldNum="0" hdr="0" ftr="0" dt="0"/>
 </p:sldLayout>
 </file>
 
@@ -5323,9 +5514,9 @@
           <a:bodyPr/>
           <a:lstStyle/>
           <a:p>
-            <a:fld id="{62D6E202-B606-4609-B914-27C9371A1F6D}" type="datetime1">
-              <a:rPr lang="en-US" smtClean="0"/>
-              <a:t>2/18/2024</a:t>
+            <a:fld id="{C2803942-A056-4559-903C-8EFAB400718C}" type="datetime1">
+              <a:rPr lang="en-US" altLang="zh-CN" smtClean="0"/>
+              <a:t>2/19/2024</a:t>
             </a:fld>
             <a:endParaRPr lang="en-US" dirty="0"/>
           </a:p>
@@ -5383,7 +5574,6 @@
   <p:clrMapOvr>
     <a:masterClrMapping/>
   </p:clrMapOvr>
-  <p:hf sldNum="0" hdr="0" ftr="0" dt="0"/>
 </p:sldLayout>
 </file>
 
@@ -5560,9 +5750,9 @@
           <a:bodyPr/>
           <a:lstStyle/>
           <a:p>
-            <a:fld id="{62D6E202-B606-4609-B914-27C9371A1F6D}" type="datetime1">
-              <a:rPr lang="en-US" smtClean="0"/>
-              <a:t>2/18/2024</a:t>
+            <a:fld id="{485E326A-435D-4A16-82FB-097E842EE5C1}" type="datetime1">
+              <a:rPr lang="en-US" altLang="zh-CN" smtClean="0"/>
+              <a:t>2/19/2024</a:t>
             </a:fld>
             <a:endParaRPr lang="en-US" dirty="0"/>
           </a:p>
@@ -5620,7 +5810,6 @@
   <p:clrMapOvr>
     <a:masterClrMapping/>
   </p:clrMapOvr>
-  <p:hf sldNum="0" hdr="0" ftr="0" dt="0"/>
 </p:sldLayout>
 </file>
 
@@ -5943,9 +6132,9 @@
           <a:bodyPr/>
           <a:lstStyle/>
           <a:p>
-            <a:fld id="{62D6E202-B606-4609-B914-27C9371A1F6D}" type="datetime1">
-              <a:rPr lang="en-US" smtClean="0"/>
-              <a:t>2/18/2024</a:t>
+            <a:fld id="{16376821-CD5F-44BA-9F5F-FF091FD1BA87}" type="datetime1">
+              <a:rPr lang="en-US" altLang="zh-CN" smtClean="0"/>
+              <a:t>2/19/2024</a:t>
             </a:fld>
             <a:endParaRPr lang="en-US" dirty="0"/>
           </a:p>
@@ -6003,7 +6192,6 @@
   <p:clrMapOvr>
     <a:masterClrMapping/>
   </p:clrMapOvr>
-  <p:hf sldNum="0" hdr="0" ftr="0" dt="0"/>
 </p:sldLayout>
 </file>
 
@@ -6062,9 +6250,9 @@
           <a:bodyPr/>
           <a:lstStyle/>
           <a:p>
-            <a:fld id="{62D6E202-B606-4609-B914-27C9371A1F6D}" type="datetime1">
-              <a:rPr lang="en-US" smtClean="0"/>
-              <a:t>2/18/2024</a:t>
+            <a:fld id="{58E31970-C7C9-42CF-903D-FD79A8736A01}" type="datetime1">
+              <a:rPr lang="en-US" altLang="zh-CN" smtClean="0"/>
+              <a:t>2/19/2024</a:t>
             </a:fld>
             <a:endParaRPr lang="en-US" dirty="0"/>
           </a:p>
@@ -6122,7 +6310,6 @@
   <p:clrMapOvr>
     <a:masterClrMapping/>
   </p:clrMapOvr>
-  <p:hf sldNum="0" hdr="0" ftr="0" dt="0"/>
 </p:sldLayout>
 </file>
 
@@ -6158,9 +6345,9 @@
           <a:bodyPr/>
           <a:lstStyle/>
           <a:p>
-            <a:fld id="{62D6E202-B606-4609-B914-27C9371A1F6D}" type="datetime1">
-              <a:rPr lang="en-US" smtClean="0"/>
-              <a:t>2/18/2024</a:t>
+            <a:fld id="{43CE5299-B38B-4C19-81CE-253B914C471A}" type="datetime1">
+              <a:rPr lang="en-US" altLang="zh-CN" smtClean="0"/>
+              <a:t>2/19/2024</a:t>
             </a:fld>
             <a:endParaRPr lang="en-US" dirty="0"/>
           </a:p>
@@ -6218,7 +6405,6 @@
   <p:clrMapOvr>
     <a:masterClrMapping/>
   </p:clrMapOvr>
-  <p:hf sldNum="0" hdr="0" ftr="0" dt="0"/>
 </p:sldLayout>
 </file>
 
@@ -6414,9 +6600,9 @@
           <a:bodyPr/>
           <a:lstStyle/>
           <a:p>
-            <a:fld id="{62D6E202-B606-4609-B914-27C9371A1F6D}" type="datetime1">
-              <a:rPr lang="en-US" smtClean="0"/>
-              <a:t>2/18/2024</a:t>
+            <a:fld id="{4A49AA5F-B633-4A1F-ACE0-24DD1DDD8F14}" type="datetime1">
+              <a:rPr lang="en-US" altLang="zh-CN" smtClean="0"/>
+              <a:t>2/19/2024</a:t>
             </a:fld>
             <a:endParaRPr lang="en-US" dirty="0"/>
           </a:p>
@@ -6474,7 +6660,6 @@
   <p:clrMapOvr>
     <a:masterClrMapping/>
   </p:clrMapOvr>
-  <p:hf sldNum="0" hdr="0" ftr="0" dt="0"/>
 </p:sldLayout>
 </file>
 
@@ -6698,9 +6883,9 @@
           <a:bodyPr/>
           <a:lstStyle/>
           <a:p>
-            <a:fld id="{62D6E202-B606-4609-B914-27C9371A1F6D}" type="datetime1">
-              <a:rPr lang="en-US" smtClean="0"/>
-              <a:t>2/18/2024</a:t>
+            <a:fld id="{968B8CB9-7696-40BD-AFC2-5566A563ADC5}" type="datetime1">
+              <a:rPr lang="en-US" altLang="zh-CN" smtClean="0"/>
+              <a:t>2/19/2024</a:t>
             </a:fld>
             <a:endParaRPr lang="en-US" dirty="0"/>
           </a:p>
@@ -6758,7 +6943,6 @@
   <p:clrMapOvr>
     <a:masterClrMapping/>
   </p:clrMapOvr>
-  <p:hf sldNum="0" hdr="0" ftr="0" dt="0"/>
 </p:sldLayout>
 </file>
 
@@ -7105,9 +7289,9 @@
             </a:lvl1pPr>
           </a:lstStyle>
           <a:p>
-            <a:fld id="{62D6E202-B606-4609-B914-27C9371A1F6D}" type="datetime1">
-              <a:rPr lang="en-US" smtClean="0"/>
-              <a:t>2/18/2024</a:t>
+            <a:fld id="{AA0DE838-60AF-4CB3-93D4-442B555D7AF3}" type="datetime1">
+              <a:rPr lang="en-US" altLang="zh-CN" smtClean="0"/>
+              <a:t>2/19/2024</a:t>
             </a:fld>
             <a:endParaRPr lang="en-US" dirty="0"/>
           </a:p>
@@ -7223,7 +7407,7 @@
     <p:sldLayoutId id="2147484524" r:id="rId17"/>
     <p:sldLayoutId id="2147484525" r:id="rId18"/>
   </p:sldLayoutIdLst>
-  <p:hf sldNum="0" hdr="0" ftr="0" dt="0"/>
+  <p:hf hdr="0" ftr="0" dt="0"/>
   <p:txStyles>
     <p:titleStyle>
       <a:lvl1pPr algn="l" defTabSz="457200" rtl="0" eaLnBrk="1" latinLnBrk="0" hangingPunct="1">
@@ -8204,6 +8388,35 @@
           </p:style>
         </p:cxnSp>
       </p:grpSp>
+      <p:sp>
+        <p:nvSpPr>
+          <p:cNvPr id="7" name="灯片编号占位符 6">
+            <a:extLst>
+              <a:ext uri="{FF2B5EF4-FFF2-40B4-BE49-F238E27FC236}">
+                <a16:creationId xmlns:a16="http://schemas.microsoft.com/office/drawing/2014/main" id="{0BD6562D-D5F8-732A-8677-B067B0AD1466}"/>
+              </a:ext>
+            </a:extLst>
+          </p:cNvPr>
+          <p:cNvSpPr>
+            <a:spLocks noGrp="1"/>
+          </p:cNvSpPr>
+          <p:nvPr>
+            <p:ph type="sldNum" sz="quarter" idx="12"/>
+          </p:nvPr>
+        </p:nvSpPr>
+        <p:spPr/>
+        <p:txBody>
+          <a:bodyPr/>
+          <a:lstStyle/>
+          <a:p>
+            <a:fld id="{3A98EE3D-8CD1-4C3F-BD1C-C98C9596463C}" type="slidenum">
+              <a:rPr lang="en-US" smtClean="0"/>
+              <a:t>1</a:t>
+            </a:fld>
+            <a:endParaRPr lang="en-US" dirty="0"/>
+          </a:p>
+        </p:txBody>
+      </p:sp>
     </p:spTree>
     <p:extLst>
       <p:ext uri="{BB962C8B-B14F-4D97-AF65-F5344CB8AC3E}">
@@ -8717,6 +8930,36 @@
           </a:prstGeom>
         </p:spPr>
       </p:pic>
+      <p:sp>
+        <p:nvSpPr>
+          <p:cNvPr id="8" name="灯片编号占位符 7">
+            <a:extLst>
+              <a:ext uri="{FF2B5EF4-FFF2-40B4-BE49-F238E27FC236}">
+                <a16:creationId xmlns:a16="http://schemas.microsoft.com/office/drawing/2014/main" id="{AA50EA0E-FA89-1090-0EEC-811F4806A2E2}"/>
+              </a:ext>
+            </a:extLst>
+          </p:cNvPr>
+          <p:cNvSpPr>
+            <a:spLocks noGrp="1"/>
+          </p:cNvSpPr>
+          <p:nvPr>
+            <p:ph type="sldNum" sz="quarter" idx="12"/>
+          </p:nvPr>
+        </p:nvSpPr>
+        <p:spPr/>
+        <p:txBody>
+          <a:bodyPr/>
+          <a:lstStyle/>
+          <a:p>
+            <a:fld id="{3A98EE3D-8CD1-4C3F-BD1C-C98C9596463C}" type="slidenum">
+              <a:rPr lang="en-US" smtClean="0"/>
+              <a:pPr/>
+              <a:t>10</a:t>
+            </a:fld>
+            <a:endParaRPr lang="en-US" dirty="0"/>
+          </a:p>
+        </p:txBody>
+      </p:sp>
     </p:spTree>
     <p:extLst>
       <p:ext uri="{BB962C8B-B14F-4D97-AF65-F5344CB8AC3E}">
@@ -9196,6 +9439,36 @@
           </a:prstGeom>
         </p:spPr>
       </p:pic>
+      <p:sp>
+        <p:nvSpPr>
+          <p:cNvPr id="8" name="灯片编号占位符 7">
+            <a:extLst>
+              <a:ext uri="{FF2B5EF4-FFF2-40B4-BE49-F238E27FC236}">
+                <a16:creationId xmlns:a16="http://schemas.microsoft.com/office/drawing/2014/main" id="{90A2A019-F7AF-5AC3-9EA4-D2402EE6CDFD}"/>
+              </a:ext>
+            </a:extLst>
+          </p:cNvPr>
+          <p:cNvSpPr>
+            <a:spLocks noGrp="1"/>
+          </p:cNvSpPr>
+          <p:nvPr>
+            <p:ph type="sldNum" sz="quarter" idx="12"/>
+          </p:nvPr>
+        </p:nvSpPr>
+        <p:spPr/>
+        <p:txBody>
+          <a:bodyPr/>
+          <a:lstStyle/>
+          <a:p>
+            <a:fld id="{3A98EE3D-8CD1-4C3F-BD1C-C98C9596463C}" type="slidenum">
+              <a:rPr lang="en-US" smtClean="0"/>
+              <a:pPr/>
+              <a:t>11</a:t>
+            </a:fld>
+            <a:endParaRPr lang="en-US" dirty="0"/>
+          </a:p>
+        </p:txBody>
+      </p:sp>
     </p:spTree>
     <p:extLst>
       <p:ext uri="{BB962C8B-B14F-4D97-AF65-F5344CB8AC3E}">
@@ -9464,6 +9737,36 @@
           </a:prstGeom>
         </p:spPr>
       </p:pic>
+      <p:sp>
+        <p:nvSpPr>
+          <p:cNvPr id="8" name="灯片编号占位符 7">
+            <a:extLst>
+              <a:ext uri="{FF2B5EF4-FFF2-40B4-BE49-F238E27FC236}">
+                <a16:creationId xmlns:a16="http://schemas.microsoft.com/office/drawing/2014/main" id="{253E6555-2EED-6AA5-074C-AC8F18E58852}"/>
+              </a:ext>
+            </a:extLst>
+          </p:cNvPr>
+          <p:cNvSpPr>
+            <a:spLocks noGrp="1"/>
+          </p:cNvSpPr>
+          <p:nvPr>
+            <p:ph type="sldNum" sz="quarter" idx="12"/>
+          </p:nvPr>
+        </p:nvSpPr>
+        <p:spPr/>
+        <p:txBody>
+          <a:bodyPr/>
+          <a:lstStyle/>
+          <a:p>
+            <a:fld id="{3A98EE3D-8CD1-4C3F-BD1C-C98C9596463C}" type="slidenum">
+              <a:rPr lang="en-US" smtClean="0"/>
+              <a:pPr/>
+              <a:t>12</a:t>
+            </a:fld>
+            <a:endParaRPr lang="en-US" dirty="0"/>
+          </a:p>
+        </p:txBody>
+      </p:sp>
     </p:spTree>
     <p:extLst>
       <p:ext uri="{BB962C8B-B14F-4D97-AF65-F5344CB8AC3E}">
@@ -9759,6 +10062,36 @@
           </a:prstGeom>
         </p:spPr>
       </p:pic>
+      <p:sp>
+        <p:nvSpPr>
+          <p:cNvPr id="8" name="灯片编号占位符 7">
+            <a:extLst>
+              <a:ext uri="{FF2B5EF4-FFF2-40B4-BE49-F238E27FC236}">
+                <a16:creationId xmlns:a16="http://schemas.microsoft.com/office/drawing/2014/main" id="{C6BFDC12-ED3E-24F2-143B-FBA5AAEF2E87}"/>
+              </a:ext>
+            </a:extLst>
+          </p:cNvPr>
+          <p:cNvSpPr>
+            <a:spLocks noGrp="1"/>
+          </p:cNvSpPr>
+          <p:nvPr>
+            <p:ph type="sldNum" sz="quarter" idx="12"/>
+          </p:nvPr>
+        </p:nvSpPr>
+        <p:spPr/>
+        <p:txBody>
+          <a:bodyPr/>
+          <a:lstStyle/>
+          <a:p>
+            <a:fld id="{3A98EE3D-8CD1-4C3F-BD1C-C98C9596463C}" type="slidenum">
+              <a:rPr lang="en-US" smtClean="0"/>
+              <a:pPr/>
+              <a:t>13</a:t>
+            </a:fld>
+            <a:endParaRPr lang="en-US" dirty="0"/>
+          </a:p>
+        </p:txBody>
+      </p:sp>
     </p:spTree>
     <p:extLst>
       <p:ext uri="{BB962C8B-B14F-4D97-AF65-F5344CB8AC3E}">
@@ -10045,6 +10378,36 @@
           </a:prstGeom>
         </p:spPr>
       </p:pic>
+      <p:sp>
+        <p:nvSpPr>
+          <p:cNvPr id="8" name="灯片编号占位符 7">
+            <a:extLst>
+              <a:ext uri="{FF2B5EF4-FFF2-40B4-BE49-F238E27FC236}">
+                <a16:creationId xmlns:a16="http://schemas.microsoft.com/office/drawing/2014/main" id="{55CD5144-18F6-D512-45CC-083F0B2EB308}"/>
+              </a:ext>
+            </a:extLst>
+          </p:cNvPr>
+          <p:cNvSpPr>
+            <a:spLocks noGrp="1"/>
+          </p:cNvSpPr>
+          <p:nvPr>
+            <p:ph type="sldNum" sz="quarter" idx="12"/>
+          </p:nvPr>
+        </p:nvSpPr>
+        <p:spPr/>
+        <p:txBody>
+          <a:bodyPr/>
+          <a:lstStyle/>
+          <a:p>
+            <a:fld id="{3A98EE3D-8CD1-4C3F-BD1C-C98C9596463C}" type="slidenum">
+              <a:rPr lang="en-US" smtClean="0"/>
+              <a:pPr/>
+              <a:t>14</a:t>
+            </a:fld>
+            <a:endParaRPr lang="en-US" dirty="0"/>
+          </a:p>
+        </p:txBody>
+      </p:sp>
     </p:spTree>
     <p:extLst>
       <p:ext uri="{BB962C8B-B14F-4D97-AF65-F5344CB8AC3E}">
@@ -10562,6 +10925,36 @@
           </a:p>
         </p:txBody>
       </p:sp>
+      <p:sp>
+        <p:nvSpPr>
+          <p:cNvPr id="9" name="灯片编号占位符 8">
+            <a:extLst>
+              <a:ext uri="{FF2B5EF4-FFF2-40B4-BE49-F238E27FC236}">
+                <a16:creationId xmlns:a16="http://schemas.microsoft.com/office/drawing/2014/main" id="{AEB08E55-74C7-260F-F947-711EF3531F2B}"/>
+              </a:ext>
+            </a:extLst>
+          </p:cNvPr>
+          <p:cNvSpPr>
+            <a:spLocks noGrp="1"/>
+          </p:cNvSpPr>
+          <p:nvPr>
+            <p:ph type="sldNum" sz="quarter" idx="12"/>
+          </p:nvPr>
+        </p:nvSpPr>
+        <p:spPr/>
+        <p:txBody>
+          <a:bodyPr/>
+          <a:lstStyle/>
+          <a:p>
+            <a:fld id="{3A98EE3D-8CD1-4C3F-BD1C-C98C9596463C}" type="slidenum">
+              <a:rPr lang="en-US" smtClean="0"/>
+              <a:pPr/>
+              <a:t>15</a:t>
+            </a:fld>
+            <a:endParaRPr lang="en-US" dirty="0"/>
+          </a:p>
+        </p:txBody>
+      </p:sp>
     </p:spTree>
     <p:extLst>
       <p:ext uri="{BB962C8B-B14F-4D97-AF65-F5344CB8AC3E}">
@@ -10747,6 +11140,36 @@
           </a:prstGeom>
         </p:spPr>
       </p:pic>
+      <p:sp>
+        <p:nvSpPr>
+          <p:cNvPr id="8" name="灯片编号占位符 7">
+            <a:extLst>
+              <a:ext uri="{FF2B5EF4-FFF2-40B4-BE49-F238E27FC236}">
+                <a16:creationId xmlns:a16="http://schemas.microsoft.com/office/drawing/2014/main" id="{6450A502-B2A8-2900-02CB-E768AF8E558A}"/>
+              </a:ext>
+            </a:extLst>
+          </p:cNvPr>
+          <p:cNvSpPr>
+            <a:spLocks noGrp="1"/>
+          </p:cNvSpPr>
+          <p:nvPr>
+            <p:ph type="sldNum" sz="quarter" idx="12"/>
+          </p:nvPr>
+        </p:nvSpPr>
+        <p:spPr/>
+        <p:txBody>
+          <a:bodyPr/>
+          <a:lstStyle/>
+          <a:p>
+            <a:fld id="{3A98EE3D-8CD1-4C3F-BD1C-C98C9596463C}" type="slidenum">
+              <a:rPr lang="en-US" smtClean="0"/>
+              <a:pPr/>
+              <a:t>16</a:t>
+            </a:fld>
+            <a:endParaRPr lang="en-US" dirty="0"/>
+          </a:p>
+        </p:txBody>
+      </p:sp>
     </p:spTree>
     <p:extLst>
       <p:ext uri="{BB962C8B-B14F-4D97-AF65-F5344CB8AC3E}">
@@ -10917,6 +11340,36 @@
           </a:prstGeom>
         </p:spPr>
       </p:pic>
+      <p:sp>
+        <p:nvSpPr>
+          <p:cNvPr id="8" name="灯片编号占位符 7">
+            <a:extLst>
+              <a:ext uri="{FF2B5EF4-FFF2-40B4-BE49-F238E27FC236}">
+                <a16:creationId xmlns:a16="http://schemas.microsoft.com/office/drawing/2014/main" id="{ADDCB2C5-7E13-D2C9-3C41-6503BA908CB1}"/>
+              </a:ext>
+            </a:extLst>
+          </p:cNvPr>
+          <p:cNvSpPr>
+            <a:spLocks noGrp="1"/>
+          </p:cNvSpPr>
+          <p:nvPr>
+            <p:ph type="sldNum" sz="quarter" idx="12"/>
+          </p:nvPr>
+        </p:nvSpPr>
+        <p:spPr/>
+        <p:txBody>
+          <a:bodyPr/>
+          <a:lstStyle/>
+          <a:p>
+            <a:fld id="{3A98EE3D-8CD1-4C3F-BD1C-C98C9596463C}" type="slidenum">
+              <a:rPr lang="en-US" smtClean="0"/>
+              <a:pPr/>
+              <a:t>17</a:t>
+            </a:fld>
+            <a:endParaRPr lang="en-US" dirty="0"/>
+          </a:p>
+        </p:txBody>
+      </p:sp>
     </p:spTree>
     <p:extLst>
       <p:ext uri="{BB962C8B-B14F-4D97-AF65-F5344CB8AC3E}">
@@ -11185,6 +11638,36 @@
           </a:prstGeom>
         </p:spPr>
       </p:pic>
+      <p:sp>
+        <p:nvSpPr>
+          <p:cNvPr id="8" name="灯片编号占位符 7">
+            <a:extLst>
+              <a:ext uri="{FF2B5EF4-FFF2-40B4-BE49-F238E27FC236}">
+                <a16:creationId xmlns:a16="http://schemas.microsoft.com/office/drawing/2014/main" id="{B1BB31CE-8FE7-71E1-0305-5C5C63674D0E}"/>
+              </a:ext>
+            </a:extLst>
+          </p:cNvPr>
+          <p:cNvSpPr>
+            <a:spLocks noGrp="1"/>
+          </p:cNvSpPr>
+          <p:nvPr>
+            <p:ph type="sldNum" sz="quarter" idx="12"/>
+          </p:nvPr>
+        </p:nvSpPr>
+        <p:spPr/>
+        <p:txBody>
+          <a:bodyPr/>
+          <a:lstStyle/>
+          <a:p>
+            <a:fld id="{3A98EE3D-8CD1-4C3F-BD1C-C98C9596463C}" type="slidenum">
+              <a:rPr lang="en-US" smtClean="0"/>
+              <a:pPr/>
+              <a:t>18</a:t>
+            </a:fld>
+            <a:endParaRPr lang="en-US" dirty="0"/>
+          </a:p>
+        </p:txBody>
+      </p:sp>
     </p:spTree>
     <p:extLst>
       <p:ext uri="{BB962C8B-B14F-4D97-AF65-F5344CB8AC3E}">
@@ -11589,6 +12072,36 @@
           </a:prstGeom>
         </p:spPr>
       </p:pic>
+      <p:sp>
+        <p:nvSpPr>
+          <p:cNvPr id="8" name="灯片编号占位符 7">
+            <a:extLst>
+              <a:ext uri="{FF2B5EF4-FFF2-40B4-BE49-F238E27FC236}">
+                <a16:creationId xmlns:a16="http://schemas.microsoft.com/office/drawing/2014/main" id="{C8266414-284A-3029-F85F-D6758E24AD98}"/>
+              </a:ext>
+            </a:extLst>
+          </p:cNvPr>
+          <p:cNvSpPr>
+            <a:spLocks noGrp="1"/>
+          </p:cNvSpPr>
+          <p:nvPr>
+            <p:ph type="sldNum" sz="quarter" idx="12"/>
+          </p:nvPr>
+        </p:nvSpPr>
+        <p:spPr/>
+        <p:txBody>
+          <a:bodyPr/>
+          <a:lstStyle/>
+          <a:p>
+            <a:fld id="{3A98EE3D-8CD1-4C3F-BD1C-C98C9596463C}" type="slidenum">
+              <a:rPr lang="en-US" smtClean="0"/>
+              <a:pPr/>
+              <a:t>19</a:t>
+            </a:fld>
+            <a:endParaRPr lang="en-US" dirty="0"/>
+          </a:p>
+        </p:txBody>
+      </p:sp>
     </p:spTree>
     <p:extLst>
       <p:ext uri="{BB962C8B-B14F-4D97-AF65-F5344CB8AC3E}">
@@ -12149,6 +12662,36 @@
           </p:style>
         </p:cxnSp>
       </p:grpSp>
+      <p:sp>
+        <p:nvSpPr>
+          <p:cNvPr id="8" name="灯片编号占位符 7">
+            <a:extLst>
+              <a:ext uri="{FF2B5EF4-FFF2-40B4-BE49-F238E27FC236}">
+                <a16:creationId xmlns:a16="http://schemas.microsoft.com/office/drawing/2014/main" id="{5A677362-F9A7-6E7B-9853-D84B6BD1E916}"/>
+              </a:ext>
+            </a:extLst>
+          </p:cNvPr>
+          <p:cNvSpPr>
+            <a:spLocks noGrp="1"/>
+          </p:cNvSpPr>
+          <p:nvPr>
+            <p:ph type="sldNum" sz="quarter" idx="12"/>
+          </p:nvPr>
+        </p:nvSpPr>
+        <p:spPr/>
+        <p:txBody>
+          <a:bodyPr/>
+          <a:lstStyle/>
+          <a:p>
+            <a:fld id="{3A98EE3D-8CD1-4C3F-BD1C-C98C9596463C}" type="slidenum">
+              <a:rPr lang="en-US" smtClean="0"/>
+              <a:pPr/>
+              <a:t>2</a:t>
+            </a:fld>
+            <a:endParaRPr lang="en-US" dirty="0"/>
+          </a:p>
+        </p:txBody>
+      </p:sp>
     </p:spTree>
     <p:extLst>
       <p:ext uri="{BB962C8B-B14F-4D97-AF65-F5344CB8AC3E}">
@@ -12530,6 +13073,36 @@
           </a:prstGeom>
         </p:spPr>
       </p:pic>
+      <p:sp>
+        <p:nvSpPr>
+          <p:cNvPr id="8" name="灯片编号占位符 7">
+            <a:extLst>
+              <a:ext uri="{FF2B5EF4-FFF2-40B4-BE49-F238E27FC236}">
+                <a16:creationId xmlns:a16="http://schemas.microsoft.com/office/drawing/2014/main" id="{1BB0917B-3EB7-8E84-795A-99C67256C514}"/>
+              </a:ext>
+            </a:extLst>
+          </p:cNvPr>
+          <p:cNvSpPr>
+            <a:spLocks noGrp="1"/>
+          </p:cNvSpPr>
+          <p:nvPr>
+            <p:ph type="sldNum" sz="quarter" idx="12"/>
+          </p:nvPr>
+        </p:nvSpPr>
+        <p:spPr/>
+        <p:txBody>
+          <a:bodyPr/>
+          <a:lstStyle/>
+          <a:p>
+            <a:fld id="{3A98EE3D-8CD1-4C3F-BD1C-C98C9596463C}" type="slidenum">
+              <a:rPr lang="en-US" smtClean="0"/>
+              <a:pPr/>
+              <a:t>20</a:t>
+            </a:fld>
+            <a:endParaRPr lang="en-US" dirty="0"/>
+          </a:p>
+        </p:txBody>
+      </p:sp>
     </p:spTree>
     <p:extLst>
       <p:ext uri="{BB962C8B-B14F-4D97-AF65-F5344CB8AC3E}">
@@ -12798,6 +13371,36 @@
           </a:prstGeom>
         </p:spPr>
       </p:pic>
+      <p:sp>
+        <p:nvSpPr>
+          <p:cNvPr id="8" name="灯片编号占位符 7">
+            <a:extLst>
+              <a:ext uri="{FF2B5EF4-FFF2-40B4-BE49-F238E27FC236}">
+                <a16:creationId xmlns:a16="http://schemas.microsoft.com/office/drawing/2014/main" id="{E9A9E3FE-61EA-F345-F2C6-129EEFEBB036}"/>
+              </a:ext>
+            </a:extLst>
+          </p:cNvPr>
+          <p:cNvSpPr>
+            <a:spLocks noGrp="1"/>
+          </p:cNvSpPr>
+          <p:nvPr>
+            <p:ph type="sldNum" sz="quarter" idx="12"/>
+          </p:nvPr>
+        </p:nvSpPr>
+        <p:spPr/>
+        <p:txBody>
+          <a:bodyPr/>
+          <a:lstStyle/>
+          <a:p>
+            <a:fld id="{3A98EE3D-8CD1-4C3F-BD1C-C98C9596463C}" type="slidenum">
+              <a:rPr lang="en-US" smtClean="0"/>
+              <a:pPr/>
+              <a:t>21</a:t>
+            </a:fld>
+            <a:endParaRPr lang="en-US" dirty="0"/>
+          </a:p>
+        </p:txBody>
+      </p:sp>
     </p:spTree>
     <p:extLst>
       <p:ext uri="{BB962C8B-B14F-4D97-AF65-F5344CB8AC3E}">
@@ -13051,6 +13654,36 @@
           </a:prstGeom>
         </p:spPr>
       </p:pic>
+      <p:sp>
+        <p:nvSpPr>
+          <p:cNvPr id="8" name="灯片编号占位符 7">
+            <a:extLst>
+              <a:ext uri="{FF2B5EF4-FFF2-40B4-BE49-F238E27FC236}">
+                <a16:creationId xmlns:a16="http://schemas.microsoft.com/office/drawing/2014/main" id="{1EC4E374-7A32-8ADE-8449-5BE06CE22657}"/>
+              </a:ext>
+            </a:extLst>
+          </p:cNvPr>
+          <p:cNvSpPr>
+            <a:spLocks noGrp="1"/>
+          </p:cNvSpPr>
+          <p:nvPr>
+            <p:ph type="sldNum" sz="quarter" idx="12"/>
+          </p:nvPr>
+        </p:nvSpPr>
+        <p:spPr/>
+        <p:txBody>
+          <a:bodyPr/>
+          <a:lstStyle/>
+          <a:p>
+            <a:fld id="{3A98EE3D-8CD1-4C3F-BD1C-C98C9596463C}" type="slidenum">
+              <a:rPr lang="en-US" smtClean="0"/>
+              <a:pPr/>
+              <a:t>22</a:t>
+            </a:fld>
+            <a:endParaRPr lang="en-US" dirty="0"/>
+          </a:p>
+        </p:txBody>
+      </p:sp>
     </p:spTree>
     <p:extLst>
       <p:ext uri="{BB962C8B-B14F-4D97-AF65-F5344CB8AC3E}">
@@ -13283,6 +13916,36 @@
           </a:prstGeom>
         </p:spPr>
       </p:pic>
+      <p:sp>
+        <p:nvSpPr>
+          <p:cNvPr id="8" name="灯片编号占位符 7">
+            <a:extLst>
+              <a:ext uri="{FF2B5EF4-FFF2-40B4-BE49-F238E27FC236}">
+                <a16:creationId xmlns:a16="http://schemas.microsoft.com/office/drawing/2014/main" id="{D457B118-A5D5-72F2-9350-AEC24EB0CD92}"/>
+              </a:ext>
+            </a:extLst>
+          </p:cNvPr>
+          <p:cNvSpPr>
+            <a:spLocks noGrp="1"/>
+          </p:cNvSpPr>
+          <p:nvPr>
+            <p:ph type="sldNum" sz="quarter" idx="12"/>
+          </p:nvPr>
+        </p:nvSpPr>
+        <p:spPr/>
+        <p:txBody>
+          <a:bodyPr/>
+          <a:lstStyle/>
+          <a:p>
+            <a:fld id="{3A98EE3D-8CD1-4C3F-BD1C-C98C9596463C}" type="slidenum">
+              <a:rPr lang="en-US" smtClean="0"/>
+              <a:pPr/>
+              <a:t>23</a:t>
+            </a:fld>
+            <a:endParaRPr lang="en-US" dirty="0"/>
+          </a:p>
+        </p:txBody>
+      </p:sp>
     </p:spTree>
     <p:extLst>
       <p:ext uri="{BB962C8B-B14F-4D97-AF65-F5344CB8AC3E}">
@@ -14250,6 +14913,36 @@
           <a:p>
             <a:pPr algn="ctr"/>
             <a:endParaRPr lang="zh-CN" altLang="en-US"/>
+          </a:p>
+        </p:txBody>
+      </p:sp>
+      <p:sp>
+        <p:nvSpPr>
+          <p:cNvPr id="16" name="灯片编号占位符 15">
+            <a:extLst>
+              <a:ext uri="{FF2B5EF4-FFF2-40B4-BE49-F238E27FC236}">
+                <a16:creationId xmlns:a16="http://schemas.microsoft.com/office/drawing/2014/main" id="{6853D3AC-8D62-34E1-B263-2F62C3124A2B}"/>
+              </a:ext>
+            </a:extLst>
+          </p:cNvPr>
+          <p:cNvSpPr>
+            <a:spLocks noGrp="1"/>
+          </p:cNvSpPr>
+          <p:nvPr>
+            <p:ph type="sldNum" sz="quarter" idx="12"/>
+          </p:nvPr>
+        </p:nvSpPr>
+        <p:spPr/>
+        <p:txBody>
+          <a:bodyPr/>
+          <a:lstStyle/>
+          <a:p>
+            <a:fld id="{3A98EE3D-8CD1-4C3F-BD1C-C98C9596463C}" type="slidenum">
+              <a:rPr lang="en-US" smtClean="0"/>
+              <a:pPr/>
+              <a:t>24</a:t>
+            </a:fld>
+            <a:endParaRPr lang="en-US" dirty="0"/>
           </a:p>
         </p:txBody>
       </p:sp>
@@ -16054,6 +16747,36 @@
           </a:p>
         </p:txBody>
       </p:sp>
+      <p:sp>
+        <p:nvSpPr>
+          <p:cNvPr id="14" name="灯片编号占位符 13">
+            <a:extLst>
+              <a:ext uri="{FF2B5EF4-FFF2-40B4-BE49-F238E27FC236}">
+                <a16:creationId xmlns:a16="http://schemas.microsoft.com/office/drawing/2014/main" id="{4FBB704B-47E0-153A-9607-6D802D2216D8}"/>
+              </a:ext>
+            </a:extLst>
+          </p:cNvPr>
+          <p:cNvSpPr>
+            <a:spLocks noGrp="1"/>
+          </p:cNvSpPr>
+          <p:nvPr>
+            <p:ph type="sldNum" sz="quarter" idx="12"/>
+          </p:nvPr>
+        </p:nvSpPr>
+        <p:spPr/>
+        <p:txBody>
+          <a:bodyPr/>
+          <a:lstStyle/>
+          <a:p>
+            <a:fld id="{3A98EE3D-8CD1-4C3F-BD1C-C98C9596463C}" type="slidenum">
+              <a:rPr lang="en-US" smtClean="0"/>
+              <a:pPr/>
+              <a:t>25</a:t>
+            </a:fld>
+            <a:endParaRPr lang="en-US" dirty="0"/>
+          </a:p>
+        </p:txBody>
+      </p:sp>
     </p:spTree>
     <p:extLst>
       <p:ext uri="{BB962C8B-B14F-4D97-AF65-F5344CB8AC3E}">
@@ -17205,6 +17928,36 @@
           <a:p>
             <a:pPr algn="ctr"/>
             <a:endParaRPr lang="zh-CN" altLang="en-US"/>
+          </a:p>
+        </p:txBody>
+      </p:sp>
+      <p:sp>
+        <p:nvSpPr>
+          <p:cNvPr id="14" name="灯片编号占位符 13">
+            <a:extLst>
+              <a:ext uri="{FF2B5EF4-FFF2-40B4-BE49-F238E27FC236}">
+                <a16:creationId xmlns:a16="http://schemas.microsoft.com/office/drawing/2014/main" id="{DC660613-7B1D-FFA2-B191-4E38888F7CF4}"/>
+              </a:ext>
+            </a:extLst>
+          </p:cNvPr>
+          <p:cNvSpPr>
+            <a:spLocks noGrp="1"/>
+          </p:cNvSpPr>
+          <p:nvPr>
+            <p:ph type="sldNum" sz="quarter" idx="12"/>
+          </p:nvPr>
+        </p:nvSpPr>
+        <p:spPr/>
+        <p:txBody>
+          <a:bodyPr/>
+          <a:lstStyle/>
+          <a:p>
+            <a:fld id="{3A98EE3D-8CD1-4C3F-BD1C-C98C9596463C}" type="slidenum">
+              <a:rPr lang="en-US" smtClean="0"/>
+              <a:pPr/>
+              <a:t>26</a:t>
+            </a:fld>
+            <a:endParaRPr lang="en-US" dirty="0"/>
           </a:p>
         </p:txBody>
       </p:sp>
@@ -18259,6 +19012,36 @@
           </a:p>
         </p:txBody>
       </p:sp>
+      <p:sp>
+        <p:nvSpPr>
+          <p:cNvPr id="9" name="灯片编号占位符 8">
+            <a:extLst>
+              <a:ext uri="{FF2B5EF4-FFF2-40B4-BE49-F238E27FC236}">
+                <a16:creationId xmlns:a16="http://schemas.microsoft.com/office/drawing/2014/main" id="{2E46F5FD-EACC-F6DB-3E76-F4BD1B37E31D}"/>
+              </a:ext>
+            </a:extLst>
+          </p:cNvPr>
+          <p:cNvSpPr>
+            <a:spLocks noGrp="1"/>
+          </p:cNvSpPr>
+          <p:nvPr>
+            <p:ph type="sldNum" sz="quarter" idx="12"/>
+          </p:nvPr>
+        </p:nvSpPr>
+        <p:spPr/>
+        <p:txBody>
+          <a:bodyPr/>
+          <a:lstStyle/>
+          <a:p>
+            <a:fld id="{3A98EE3D-8CD1-4C3F-BD1C-C98C9596463C}" type="slidenum">
+              <a:rPr lang="en-US" smtClean="0"/>
+              <a:pPr/>
+              <a:t>27</a:t>
+            </a:fld>
+            <a:endParaRPr lang="en-US" dirty="0"/>
+          </a:p>
+        </p:txBody>
+      </p:sp>
     </p:spTree>
     <p:extLst>
       <p:ext uri="{BB962C8B-B14F-4D97-AF65-F5344CB8AC3E}">
@@ -18407,6 +19190,38 @@
           </a:prstGeom>
         </p:spPr>
       </p:pic>
+      <p:sp>
+        <p:nvSpPr>
+          <p:cNvPr id="6" name="灯片编号占位符 5">
+            <a:extLst>
+              <a:ext uri="{FF2B5EF4-FFF2-40B4-BE49-F238E27FC236}">
+                <a16:creationId xmlns:a16="http://schemas.microsoft.com/office/drawing/2014/main" id="{6BAB56FB-7149-6683-AC32-40ED7269CF63}"/>
+              </a:ext>
+            </a:extLst>
+          </p:cNvPr>
+          <p:cNvSpPr>
+            <a:spLocks noGrp="1"/>
+          </p:cNvSpPr>
+          <p:nvPr>
+            <p:ph type="sldNum" idx="12"/>
+          </p:nvPr>
+        </p:nvSpPr>
+        <p:spPr/>
+        <p:txBody>
+          <a:bodyPr>
+            <a:normAutofit fontScale="85000" lnSpcReduction="20000"/>
+          </a:bodyPr>
+          <a:lstStyle/>
+          <a:p>
+            <a:fld id="{00000000-1234-1234-1234-123412341234}" type="slidenum">
+              <a:rPr lang="en-US" altLang="zh-TW" smtClean="0"/>
+              <a:pPr/>
+              <a:t>28</a:t>
+            </a:fld>
+            <a:endParaRPr lang="zh-TW" altLang="en-US"/>
+          </a:p>
+        </p:txBody>
+      </p:sp>
     </p:spTree>
   </p:cSld>
   <p:clrMapOvr>
@@ -18589,6 +19404,38 @@
           </a:prstGeom>
         </p:spPr>
       </p:pic>
+      <p:sp>
+        <p:nvSpPr>
+          <p:cNvPr id="6" name="灯片编号占位符 5">
+            <a:extLst>
+              <a:ext uri="{FF2B5EF4-FFF2-40B4-BE49-F238E27FC236}">
+                <a16:creationId xmlns:a16="http://schemas.microsoft.com/office/drawing/2014/main" id="{AE1B1FB6-274A-4A9C-B070-CFA77FF11D4B}"/>
+              </a:ext>
+            </a:extLst>
+          </p:cNvPr>
+          <p:cNvSpPr>
+            <a:spLocks noGrp="1"/>
+          </p:cNvSpPr>
+          <p:nvPr>
+            <p:ph type="sldNum" idx="12"/>
+          </p:nvPr>
+        </p:nvSpPr>
+        <p:spPr/>
+        <p:txBody>
+          <a:bodyPr>
+            <a:normAutofit fontScale="85000" lnSpcReduction="20000"/>
+          </a:bodyPr>
+          <a:lstStyle/>
+          <a:p>
+            <a:fld id="{00000000-1234-1234-1234-123412341234}" type="slidenum">
+              <a:rPr lang="en-US" altLang="zh-TW" smtClean="0"/>
+              <a:pPr/>
+              <a:t>29</a:t>
+            </a:fld>
+            <a:endParaRPr lang="zh-TW" altLang="en-US"/>
+          </a:p>
+        </p:txBody>
+      </p:sp>
     </p:spTree>
   </p:cSld>
   <p:clrMapOvr>
@@ -18855,6 +19702,36 @@
                 <a:schemeClr val="tx1"/>
               </a:solidFill>
             </a:endParaRPr>
+          </a:p>
+        </p:txBody>
+      </p:sp>
+      <p:sp>
+        <p:nvSpPr>
+          <p:cNvPr id="7" name="灯片编号占位符 6">
+            <a:extLst>
+              <a:ext uri="{FF2B5EF4-FFF2-40B4-BE49-F238E27FC236}">
+                <a16:creationId xmlns:a16="http://schemas.microsoft.com/office/drawing/2014/main" id="{65BA8692-4AC9-1A40-7517-A3555A82F6CF}"/>
+              </a:ext>
+            </a:extLst>
+          </p:cNvPr>
+          <p:cNvSpPr>
+            <a:spLocks noGrp="1"/>
+          </p:cNvSpPr>
+          <p:nvPr>
+            <p:ph type="sldNum" sz="quarter" idx="12"/>
+          </p:nvPr>
+        </p:nvSpPr>
+        <p:spPr/>
+        <p:txBody>
+          <a:bodyPr/>
+          <a:lstStyle/>
+          <a:p>
+            <a:fld id="{3A98EE3D-8CD1-4C3F-BD1C-C98C9596463C}" type="slidenum">
+              <a:rPr lang="en-US" smtClean="0"/>
+              <a:pPr/>
+              <a:t>3</a:t>
+            </a:fld>
+            <a:endParaRPr lang="en-US" dirty="0"/>
           </a:p>
         </p:txBody>
       </p:sp>
@@ -19024,6 +19901,38 @@
           </a:prstGeom>
         </p:spPr>
       </p:pic>
+      <p:sp>
+        <p:nvSpPr>
+          <p:cNvPr id="6" name="灯片编号占位符 5">
+            <a:extLst>
+              <a:ext uri="{FF2B5EF4-FFF2-40B4-BE49-F238E27FC236}">
+                <a16:creationId xmlns:a16="http://schemas.microsoft.com/office/drawing/2014/main" id="{20C5D3E0-296C-E2C0-73FA-B2FFD4720748}"/>
+              </a:ext>
+            </a:extLst>
+          </p:cNvPr>
+          <p:cNvSpPr>
+            <a:spLocks noGrp="1"/>
+          </p:cNvSpPr>
+          <p:nvPr>
+            <p:ph type="sldNum" idx="12"/>
+          </p:nvPr>
+        </p:nvSpPr>
+        <p:spPr/>
+        <p:txBody>
+          <a:bodyPr>
+            <a:normAutofit fontScale="85000" lnSpcReduction="20000"/>
+          </a:bodyPr>
+          <a:lstStyle/>
+          <a:p>
+            <a:fld id="{00000000-1234-1234-1234-123412341234}" type="slidenum">
+              <a:rPr lang="en-US" altLang="zh-TW" smtClean="0"/>
+              <a:pPr/>
+              <a:t>30</a:t>
+            </a:fld>
+            <a:endParaRPr lang="zh-TW" altLang="en-US"/>
+          </a:p>
+        </p:txBody>
+      </p:sp>
     </p:spTree>
     <p:extLst>
       <p:ext uri="{BB962C8B-B14F-4D97-AF65-F5344CB8AC3E}">
@@ -19235,6 +20144,38 @@
           </a:ln>
         </p:spPr>
       </p:pic>
+      <p:sp>
+        <p:nvSpPr>
+          <p:cNvPr id="5" name="灯片编号占位符 4">
+            <a:extLst>
+              <a:ext uri="{FF2B5EF4-FFF2-40B4-BE49-F238E27FC236}">
+                <a16:creationId xmlns:a16="http://schemas.microsoft.com/office/drawing/2014/main" id="{6D75A0F4-E60E-BE55-656E-9FF52C31A9B1}"/>
+              </a:ext>
+            </a:extLst>
+          </p:cNvPr>
+          <p:cNvSpPr>
+            <a:spLocks noGrp="1"/>
+          </p:cNvSpPr>
+          <p:nvPr>
+            <p:ph type="sldNum" idx="12"/>
+          </p:nvPr>
+        </p:nvSpPr>
+        <p:spPr/>
+        <p:txBody>
+          <a:bodyPr>
+            <a:normAutofit fontScale="85000" lnSpcReduction="20000"/>
+          </a:bodyPr>
+          <a:lstStyle/>
+          <a:p>
+            <a:fld id="{00000000-1234-1234-1234-123412341234}" type="slidenum">
+              <a:rPr lang="en-US" altLang="zh-TW" smtClean="0"/>
+              <a:pPr/>
+              <a:t>31</a:t>
+            </a:fld>
+            <a:endParaRPr lang="zh-TW" altLang="en-US"/>
+          </a:p>
+        </p:txBody>
+      </p:sp>
     </p:spTree>
   </p:cSld>
   <p:clrMapOvr>
@@ -19411,6 +20352,38 @@
           </a:prstGeom>
         </p:spPr>
       </p:pic>
+      <p:sp>
+        <p:nvSpPr>
+          <p:cNvPr id="6" name="灯片编号占位符 5">
+            <a:extLst>
+              <a:ext uri="{FF2B5EF4-FFF2-40B4-BE49-F238E27FC236}">
+                <a16:creationId xmlns:a16="http://schemas.microsoft.com/office/drawing/2014/main" id="{62DB8FB0-0679-83D6-0940-9BFD6CAF4447}"/>
+              </a:ext>
+            </a:extLst>
+          </p:cNvPr>
+          <p:cNvSpPr>
+            <a:spLocks noGrp="1"/>
+          </p:cNvSpPr>
+          <p:nvPr>
+            <p:ph type="sldNum" idx="12"/>
+          </p:nvPr>
+        </p:nvSpPr>
+        <p:spPr/>
+        <p:txBody>
+          <a:bodyPr>
+            <a:normAutofit fontScale="85000" lnSpcReduction="20000"/>
+          </a:bodyPr>
+          <a:lstStyle/>
+          <a:p>
+            <a:fld id="{00000000-1234-1234-1234-123412341234}" type="slidenum">
+              <a:rPr lang="en-US" altLang="zh-TW" smtClean="0"/>
+              <a:pPr/>
+              <a:t>32</a:t>
+            </a:fld>
+            <a:endParaRPr lang="zh-TW" altLang="en-US"/>
+          </a:p>
+        </p:txBody>
+      </p:sp>
     </p:spTree>
     <p:extLst>
       <p:ext uri="{BB962C8B-B14F-4D97-AF65-F5344CB8AC3E}">
@@ -19635,6 +20608,38 @@
           </a:prstGeom>
         </p:spPr>
       </p:pic>
+      <p:sp>
+        <p:nvSpPr>
+          <p:cNvPr id="6" name="灯片编号占位符 5">
+            <a:extLst>
+              <a:ext uri="{FF2B5EF4-FFF2-40B4-BE49-F238E27FC236}">
+                <a16:creationId xmlns:a16="http://schemas.microsoft.com/office/drawing/2014/main" id="{BB41E6DA-6941-00F9-069E-987262A3630B}"/>
+              </a:ext>
+            </a:extLst>
+          </p:cNvPr>
+          <p:cNvSpPr>
+            <a:spLocks noGrp="1"/>
+          </p:cNvSpPr>
+          <p:nvPr>
+            <p:ph type="sldNum" idx="12"/>
+          </p:nvPr>
+        </p:nvSpPr>
+        <p:spPr/>
+        <p:txBody>
+          <a:bodyPr>
+            <a:normAutofit fontScale="85000" lnSpcReduction="20000"/>
+          </a:bodyPr>
+          <a:lstStyle/>
+          <a:p>
+            <a:fld id="{00000000-1234-1234-1234-123412341234}" type="slidenum">
+              <a:rPr lang="en-US" altLang="zh-TW" smtClean="0"/>
+              <a:pPr/>
+              <a:t>33</a:t>
+            </a:fld>
+            <a:endParaRPr lang="zh-TW" altLang="en-US"/>
+          </a:p>
+        </p:txBody>
+      </p:sp>
     </p:spTree>
   </p:cSld>
   <p:clrMapOvr>
@@ -19811,6 +20816,38 @@
           </a:prstGeom>
         </p:spPr>
       </p:pic>
+      <p:sp>
+        <p:nvSpPr>
+          <p:cNvPr id="6" name="灯片编号占位符 5">
+            <a:extLst>
+              <a:ext uri="{FF2B5EF4-FFF2-40B4-BE49-F238E27FC236}">
+                <a16:creationId xmlns:a16="http://schemas.microsoft.com/office/drawing/2014/main" id="{D6235528-4614-BD8E-03C3-BB69D7A9411F}"/>
+              </a:ext>
+            </a:extLst>
+          </p:cNvPr>
+          <p:cNvSpPr>
+            <a:spLocks noGrp="1"/>
+          </p:cNvSpPr>
+          <p:nvPr>
+            <p:ph type="sldNum" idx="12"/>
+          </p:nvPr>
+        </p:nvSpPr>
+        <p:spPr/>
+        <p:txBody>
+          <a:bodyPr>
+            <a:normAutofit fontScale="85000" lnSpcReduction="20000"/>
+          </a:bodyPr>
+          <a:lstStyle/>
+          <a:p>
+            <a:fld id="{00000000-1234-1234-1234-123412341234}" type="slidenum">
+              <a:rPr lang="en-US" altLang="zh-TW" smtClean="0"/>
+              <a:pPr/>
+              <a:t>34</a:t>
+            </a:fld>
+            <a:endParaRPr lang="zh-TW" altLang="en-US"/>
+          </a:p>
+        </p:txBody>
+      </p:sp>
     </p:spTree>
     <p:extLst>
       <p:ext uri="{BB962C8B-B14F-4D97-AF65-F5344CB8AC3E}">
@@ -20048,6 +21085,38 @@
           </a:prstGeom>
         </p:spPr>
       </p:pic>
+      <p:sp>
+        <p:nvSpPr>
+          <p:cNvPr id="6" name="灯片编号占位符 5">
+            <a:extLst>
+              <a:ext uri="{FF2B5EF4-FFF2-40B4-BE49-F238E27FC236}">
+                <a16:creationId xmlns:a16="http://schemas.microsoft.com/office/drawing/2014/main" id="{C90B5521-F0D0-569E-AB45-2E62E7994E93}"/>
+              </a:ext>
+            </a:extLst>
+          </p:cNvPr>
+          <p:cNvSpPr>
+            <a:spLocks noGrp="1"/>
+          </p:cNvSpPr>
+          <p:nvPr>
+            <p:ph type="sldNum" idx="12"/>
+          </p:nvPr>
+        </p:nvSpPr>
+        <p:spPr/>
+        <p:txBody>
+          <a:bodyPr>
+            <a:normAutofit fontScale="85000" lnSpcReduction="20000"/>
+          </a:bodyPr>
+          <a:lstStyle/>
+          <a:p>
+            <a:fld id="{00000000-1234-1234-1234-123412341234}" type="slidenum">
+              <a:rPr lang="en-US" altLang="zh-TW" smtClean="0"/>
+              <a:pPr/>
+              <a:t>35</a:t>
+            </a:fld>
+            <a:endParaRPr lang="zh-TW" altLang="en-US"/>
+          </a:p>
+        </p:txBody>
+      </p:sp>
     </p:spTree>
   </p:cSld>
   <p:clrMapOvr>
@@ -20192,6 +21261,38 @@
           </a:prstGeom>
         </p:spPr>
       </p:pic>
+      <p:sp>
+        <p:nvSpPr>
+          <p:cNvPr id="6" name="灯片编号占位符 5">
+            <a:extLst>
+              <a:ext uri="{FF2B5EF4-FFF2-40B4-BE49-F238E27FC236}">
+                <a16:creationId xmlns:a16="http://schemas.microsoft.com/office/drawing/2014/main" id="{7A06CAB8-F524-49C2-5B60-562270A82B7E}"/>
+              </a:ext>
+            </a:extLst>
+          </p:cNvPr>
+          <p:cNvSpPr>
+            <a:spLocks noGrp="1"/>
+          </p:cNvSpPr>
+          <p:nvPr>
+            <p:ph type="sldNum" idx="12"/>
+          </p:nvPr>
+        </p:nvSpPr>
+        <p:spPr/>
+        <p:txBody>
+          <a:bodyPr>
+            <a:normAutofit fontScale="85000" lnSpcReduction="20000"/>
+          </a:bodyPr>
+          <a:lstStyle/>
+          <a:p>
+            <a:fld id="{00000000-1234-1234-1234-123412341234}" type="slidenum">
+              <a:rPr lang="en-US" altLang="zh-TW" smtClean="0"/>
+              <a:pPr/>
+              <a:t>36</a:t>
+            </a:fld>
+            <a:endParaRPr lang="zh-TW" altLang="en-US"/>
+          </a:p>
+        </p:txBody>
+      </p:sp>
     </p:spTree>
   </p:cSld>
   <p:clrMapOvr>
@@ -20372,6 +21473,38 @@
           </a:ln>
         </p:spPr>
       </p:pic>
+      <p:sp>
+        <p:nvSpPr>
+          <p:cNvPr id="6" name="灯片编号占位符 5">
+            <a:extLst>
+              <a:ext uri="{FF2B5EF4-FFF2-40B4-BE49-F238E27FC236}">
+                <a16:creationId xmlns:a16="http://schemas.microsoft.com/office/drawing/2014/main" id="{27A12718-8CF9-066D-823D-2E36E8578ADD}"/>
+              </a:ext>
+            </a:extLst>
+          </p:cNvPr>
+          <p:cNvSpPr>
+            <a:spLocks noGrp="1"/>
+          </p:cNvSpPr>
+          <p:nvPr>
+            <p:ph type="sldNum" idx="12"/>
+          </p:nvPr>
+        </p:nvSpPr>
+        <p:spPr/>
+        <p:txBody>
+          <a:bodyPr>
+            <a:normAutofit fontScale="85000" lnSpcReduction="20000"/>
+          </a:bodyPr>
+          <a:lstStyle/>
+          <a:p>
+            <a:fld id="{00000000-1234-1234-1234-123412341234}" type="slidenum">
+              <a:rPr lang="en-US" altLang="zh-TW" smtClean="0"/>
+              <a:pPr/>
+              <a:t>37</a:t>
+            </a:fld>
+            <a:endParaRPr lang="zh-TW" altLang="en-US"/>
+          </a:p>
+        </p:txBody>
+      </p:sp>
     </p:spTree>
   </p:cSld>
   <p:clrMapOvr>
@@ -20659,6 +21792,38 @@
           <a:p>
             <a:pPr algn="ctr"/>
             <a:endParaRPr lang="zh-CN" altLang="en-US" dirty="0"/>
+          </a:p>
+        </p:txBody>
+      </p:sp>
+      <p:sp>
+        <p:nvSpPr>
+          <p:cNvPr id="8" name="灯片编号占位符 7">
+            <a:extLst>
+              <a:ext uri="{FF2B5EF4-FFF2-40B4-BE49-F238E27FC236}">
+                <a16:creationId xmlns:a16="http://schemas.microsoft.com/office/drawing/2014/main" id="{16E4E7D1-0EFD-8D71-6E64-77A691BC0F60}"/>
+              </a:ext>
+            </a:extLst>
+          </p:cNvPr>
+          <p:cNvSpPr>
+            <a:spLocks noGrp="1"/>
+          </p:cNvSpPr>
+          <p:nvPr>
+            <p:ph type="sldNum" idx="12"/>
+          </p:nvPr>
+        </p:nvSpPr>
+        <p:spPr/>
+        <p:txBody>
+          <a:bodyPr>
+            <a:normAutofit fontScale="85000" lnSpcReduction="20000"/>
+          </a:bodyPr>
+          <a:lstStyle/>
+          <a:p>
+            <a:fld id="{00000000-1234-1234-1234-123412341234}" type="slidenum">
+              <a:rPr lang="en-US" altLang="zh-TW" smtClean="0"/>
+              <a:pPr/>
+              <a:t>38</a:t>
+            </a:fld>
+            <a:endParaRPr lang="zh-TW" altLang="en-US"/>
           </a:p>
         </p:txBody>
       </p:sp>
@@ -20866,6 +22031,38 @@
           </a:p>
         </p:txBody>
       </p:sp>
+      <p:sp>
+        <p:nvSpPr>
+          <p:cNvPr id="5" name="灯片编号占位符 4">
+            <a:extLst>
+              <a:ext uri="{FF2B5EF4-FFF2-40B4-BE49-F238E27FC236}">
+                <a16:creationId xmlns:a16="http://schemas.microsoft.com/office/drawing/2014/main" id="{F36783EB-8E7A-3298-649F-67AEF7852B47}"/>
+              </a:ext>
+            </a:extLst>
+          </p:cNvPr>
+          <p:cNvSpPr>
+            <a:spLocks noGrp="1"/>
+          </p:cNvSpPr>
+          <p:nvPr>
+            <p:ph type="sldNum" idx="12"/>
+          </p:nvPr>
+        </p:nvSpPr>
+        <p:spPr/>
+        <p:txBody>
+          <a:bodyPr>
+            <a:normAutofit fontScale="85000" lnSpcReduction="20000"/>
+          </a:bodyPr>
+          <a:lstStyle/>
+          <a:p>
+            <a:fld id="{00000000-1234-1234-1234-123412341234}" type="slidenum">
+              <a:rPr lang="en-US" altLang="zh-TW" smtClean="0"/>
+              <a:pPr/>
+              <a:t>39</a:t>
+            </a:fld>
+            <a:endParaRPr lang="zh-TW" altLang="en-US"/>
+          </a:p>
+        </p:txBody>
+      </p:sp>
     </p:spTree>
     <p:extLst>
       <p:ext uri="{BB962C8B-B14F-4D97-AF65-F5344CB8AC3E}">
@@ -21087,6 +22284,36 @@
           </a:p>
         </p:txBody>
       </p:sp>
+      <p:sp>
+        <p:nvSpPr>
+          <p:cNvPr id="7" name="灯片编号占位符 6">
+            <a:extLst>
+              <a:ext uri="{FF2B5EF4-FFF2-40B4-BE49-F238E27FC236}">
+                <a16:creationId xmlns:a16="http://schemas.microsoft.com/office/drawing/2014/main" id="{A5847089-A1BC-6A71-FB5B-D3CAC4270014}"/>
+              </a:ext>
+            </a:extLst>
+          </p:cNvPr>
+          <p:cNvSpPr>
+            <a:spLocks noGrp="1"/>
+          </p:cNvSpPr>
+          <p:nvPr>
+            <p:ph type="sldNum" sz="quarter" idx="12"/>
+          </p:nvPr>
+        </p:nvSpPr>
+        <p:spPr/>
+        <p:txBody>
+          <a:bodyPr/>
+          <a:lstStyle/>
+          <a:p>
+            <a:fld id="{3A98EE3D-8CD1-4C3F-BD1C-C98C9596463C}" type="slidenum">
+              <a:rPr lang="en-US" smtClean="0"/>
+              <a:pPr/>
+              <a:t>4</a:t>
+            </a:fld>
+            <a:endParaRPr lang="en-US" dirty="0"/>
+          </a:p>
+        </p:txBody>
+      </p:sp>
     </p:spTree>
     <p:extLst>
       <p:ext uri="{BB962C8B-B14F-4D97-AF65-F5344CB8AC3E}">
@@ -21307,6 +22534,38 @@
                 <a:schemeClr val="tx1"/>
               </a:solidFill>
             </a:endParaRPr>
+          </a:p>
+        </p:txBody>
+      </p:sp>
+      <p:sp>
+        <p:nvSpPr>
+          <p:cNvPr id="5" name="灯片编号占位符 4">
+            <a:extLst>
+              <a:ext uri="{FF2B5EF4-FFF2-40B4-BE49-F238E27FC236}">
+                <a16:creationId xmlns:a16="http://schemas.microsoft.com/office/drawing/2014/main" id="{1DEFB752-55C7-9D45-EEC5-555BE0497AB6}"/>
+              </a:ext>
+            </a:extLst>
+          </p:cNvPr>
+          <p:cNvSpPr>
+            <a:spLocks noGrp="1"/>
+          </p:cNvSpPr>
+          <p:nvPr>
+            <p:ph type="sldNum" idx="12"/>
+          </p:nvPr>
+        </p:nvSpPr>
+        <p:spPr/>
+        <p:txBody>
+          <a:bodyPr>
+            <a:normAutofit fontScale="85000" lnSpcReduction="20000"/>
+          </a:bodyPr>
+          <a:lstStyle/>
+          <a:p>
+            <a:fld id="{00000000-1234-1234-1234-123412341234}" type="slidenum">
+              <a:rPr lang="en-US" altLang="zh-TW" smtClean="0"/>
+              <a:pPr/>
+              <a:t>40</a:t>
+            </a:fld>
+            <a:endParaRPr lang="zh-TW" altLang="en-US"/>
           </a:p>
         </p:txBody>
       </p:sp>
@@ -21542,6 +22801,36 @@
           </a:prstGeom>
         </p:spPr>
       </p:pic>
+      <p:sp>
+        <p:nvSpPr>
+          <p:cNvPr id="8" name="灯片编号占位符 7">
+            <a:extLst>
+              <a:ext uri="{FF2B5EF4-FFF2-40B4-BE49-F238E27FC236}">
+                <a16:creationId xmlns:a16="http://schemas.microsoft.com/office/drawing/2014/main" id="{23DAA4EE-B504-1A1D-53D7-995539FF08D7}"/>
+              </a:ext>
+            </a:extLst>
+          </p:cNvPr>
+          <p:cNvSpPr>
+            <a:spLocks noGrp="1"/>
+          </p:cNvSpPr>
+          <p:nvPr>
+            <p:ph type="sldNum" sz="quarter" idx="12"/>
+          </p:nvPr>
+        </p:nvSpPr>
+        <p:spPr/>
+        <p:txBody>
+          <a:bodyPr/>
+          <a:lstStyle/>
+          <a:p>
+            <a:fld id="{3A98EE3D-8CD1-4C3F-BD1C-C98C9596463C}" type="slidenum">
+              <a:rPr lang="en-US" smtClean="0"/>
+              <a:pPr/>
+              <a:t>5</a:t>
+            </a:fld>
+            <a:endParaRPr lang="en-US" dirty="0"/>
+          </a:p>
+        </p:txBody>
+      </p:sp>
     </p:spTree>
     <p:extLst>
       <p:ext uri="{BB962C8B-B14F-4D97-AF65-F5344CB8AC3E}">
@@ -22426,6 +23715,36 @@
           </a:p>
         </p:txBody>
       </p:sp>
+      <p:sp>
+        <p:nvSpPr>
+          <p:cNvPr id="9" name="灯片编号占位符 8">
+            <a:extLst>
+              <a:ext uri="{FF2B5EF4-FFF2-40B4-BE49-F238E27FC236}">
+                <a16:creationId xmlns:a16="http://schemas.microsoft.com/office/drawing/2014/main" id="{DB6B8E1C-6E73-2B87-E661-574B769B14C9}"/>
+              </a:ext>
+            </a:extLst>
+          </p:cNvPr>
+          <p:cNvSpPr>
+            <a:spLocks noGrp="1"/>
+          </p:cNvSpPr>
+          <p:nvPr>
+            <p:ph type="sldNum" sz="quarter" idx="12"/>
+          </p:nvPr>
+        </p:nvSpPr>
+        <p:spPr/>
+        <p:txBody>
+          <a:bodyPr/>
+          <a:lstStyle/>
+          <a:p>
+            <a:fld id="{3A98EE3D-8CD1-4C3F-BD1C-C98C9596463C}" type="slidenum">
+              <a:rPr lang="en-US" smtClean="0"/>
+              <a:pPr/>
+              <a:t>6</a:t>
+            </a:fld>
+            <a:endParaRPr lang="en-US" dirty="0"/>
+          </a:p>
+        </p:txBody>
+      </p:sp>
     </p:spTree>
     <p:extLst>
       <p:ext uri="{BB962C8B-B14F-4D97-AF65-F5344CB8AC3E}">
@@ -22611,6 +23930,36 @@
           </a:prstGeom>
         </p:spPr>
       </p:pic>
+      <p:sp>
+        <p:nvSpPr>
+          <p:cNvPr id="8" name="灯片编号占位符 7">
+            <a:extLst>
+              <a:ext uri="{FF2B5EF4-FFF2-40B4-BE49-F238E27FC236}">
+                <a16:creationId xmlns:a16="http://schemas.microsoft.com/office/drawing/2014/main" id="{9BB73F8B-A3F6-1864-F772-76E6E99AC179}"/>
+              </a:ext>
+            </a:extLst>
+          </p:cNvPr>
+          <p:cNvSpPr>
+            <a:spLocks noGrp="1"/>
+          </p:cNvSpPr>
+          <p:nvPr>
+            <p:ph type="sldNum" sz="quarter" idx="12"/>
+          </p:nvPr>
+        </p:nvSpPr>
+        <p:spPr/>
+        <p:txBody>
+          <a:bodyPr/>
+          <a:lstStyle/>
+          <a:p>
+            <a:fld id="{3A98EE3D-8CD1-4C3F-BD1C-C98C9596463C}" type="slidenum">
+              <a:rPr lang="en-US" smtClean="0"/>
+              <a:pPr/>
+              <a:t>7</a:t>
+            </a:fld>
+            <a:endParaRPr lang="en-US" dirty="0"/>
+          </a:p>
+        </p:txBody>
+      </p:sp>
     </p:spTree>
     <p:extLst>
       <p:ext uri="{BB962C8B-B14F-4D97-AF65-F5344CB8AC3E}">
@@ -22827,6 +24176,36 @@
           </a:prstGeom>
         </p:spPr>
       </p:pic>
+      <p:sp>
+        <p:nvSpPr>
+          <p:cNvPr id="8" name="灯片编号占位符 7">
+            <a:extLst>
+              <a:ext uri="{FF2B5EF4-FFF2-40B4-BE49-F238E27FC236}">
+                <a16:creationId xmlns:a16="http://schemas.microsoft.com/office/drawing/2014/main" id="{FC11F517-26AC-918A-BEA0-A4A752BEAABE}"/>
+              </a:ext>
+            </a:extLst>
+          </p:cNvPr>
+          <p:cNvSpPr>
+            <a:spLocks noGrp="1"/>
+          </p:cNvSpPr>
+          <p:nvPr>
+            <p:ph type="sldNum" sz="quarter" idx="12"/>
+          </p:nvPr>
+        </p:nvSpPr>
+        <p:spPr/>
+        <p:txBody>
+          <a:bodyPr/>
+          <a:lstStyle/>
+          <a:p>
+            <a:fld id="{3A98EE3D-8CD1-4C3F-BD1C-C98C9596463C}" type="slidenum">
+              <a:rPr lang="en-US" smtClean="0"/>
+              <a:pPr/>
+              <a:t>8</a:t>
+            </a:fld>
+            <a:endParaRPr lang="en-US" dirty="0"/>
+          </a:p>
+        </p:txBody>
+      </p:sp>
     </p:spTree>
     <p:extLst>
       <p:ext uri="{BB962C8B-B14F-4D97-AF65-F5344CB8AC3E}">
@@ -23095,6 +24474,36 @@
           </a:prstGeom>
         </p:spPr>
       </p:pic>
+      <p:sp>
+        <p:nvSpPr>
+          <p:cNvPr id="8" name="灯片编号占位符 7">
+            <a:extLst>
+              <a:ext uri="{FF2B5EF4-FFF2-40B4-BE49-F238E27FC236}">
+                <a16:creationId xmlns:a16="http://schemas.microsoft.com/office/drawing/2014/main" id="{59E176E4-9B77-B9DF-9484-5C1E3BAAA7D6}"/>
+              </a:ext>
+            </a:extLst>
+          </p:cNvPr>
+          <p:cNvSpPr>
+            <a:spLocks noGrp="1"/>
+          </p:cNvSpPr>
+          <p:nvPr>
+            <p:ph type="sldNum" sz="quarter" idx="12"/>
+          </p:nvPr>
+        </p:nvSpPr>
+        <p:spPr/>
+        <p:txBody>
+          <a:bodyPr/>
+          <a:lstStyle/>
+          <a:p>
+            <a:fld id="{3A98EE3D-8CD1-4C3F-BD1C-C98C9596463C}" type="slidenum">
+              <a:rPr lang="en-US" smtClean="0"/>
+              <a:pPr/>
+              <a:t>9</a:t>
+            </a:fld>
+            <a:endParaRPr lang="en-US" dirty="0"/>
+          </a:p>
+        </p:txBody>
+      </p:sp>
     </p:spTree>
     <p:extLst>
       <p:ext uri="{BB962C8B-B14F-4D97-AF65-F5344CB8AC3E}">
@@ -23675,4 +25084,299 @@
     </a:ext>
   </a:extLst>
 </a:theme>
+</file>
+
+<file path=ppt/theme/theme3.xml><?xml version="1.0" encoding="utf-8"?>
+<a:theme xmlns:a="http://schemas.openxmlformats.org/drawingml/2006/main" name="Office 主题​​">
+  <a:themeElements>
+    <a:clrScheme name="Office">
+      <a:dk1>
+        <a:sysClr val="windowText" lastClr="000000"/>
+      </a:dk1>
+      <a:lt1>
+        <a:sysClr val="window" lastClr="FFFFFF"/>
+      </a:lt1>
+      <a:dk2>
+        <a:srgbClr val="44546A"/>
+      </a:dk2>
+      <a:lt2>
+        <a:srgbClr val="E7E6E6"/>
+      </a:lt2>
+      <a:accent1>
+        <a:srgbClr val="4472C4"/>
+      </a:accent1>
+      <a:accent2>
+        <a:srgbClr val="ED7D31"/>
+      </a:accent2>
+      <a:accent3>
+        <a:srgbClr val="A5A5A5"/>
+      </a:accent3>
+      <a:accent4>
+        <a:srgbClr val="FFC000"/>
+      </a:accent4>
+      <a:accent5>
+        <a:srgbClr val="5B9BD5"/>
+      </a:accent5>
+      <a:accent6>
+        <a:srgbClr val="70AD47"/>
+      </a:accent6>
+      <a:hlink>
+        <a:srgbClr val="0563C1"/>
+      </a:hlink>
+      <a:folHlink>
+        <a:srgbClr val="954F72"/>
+      </a:folHlink>
+    </a:clrScheme>
+    <a:fontScheme name="Office">
+      <a:majorFont>
+        <a:latin typeface="等线 Light" panose="020F0302020204030204"/>
+        <a:ea typeface=""/>
+        <a:cs typeface=""/>
+        <a:font script="Jpan" typeface="游ゴシック Light"/>
+        <a:font script="Hang" typeface="맑은 고딕"/>
+        <a:font script="Hans" typeface="等线 Light"/>
+        <a:font script="Hant" typeface="新細明體"/>
+        <a:font script="Arab" typeface="Times New Roman"/>
+        <a:font script="Hebr" typeface="Times New Roman"/>
+        <a:font script="Thai" typeface="Angsana New"/>
+        <a:font script="Ethi" typeface="Nyala"/>
+        <a:font script="Beng" typeface="Vrinda"/>
+        <a:font script="Gujr" typeface="Shruti"/>
+        <a:font script="Khmr" typeface="MoolBoran"/>
+        <a:font script="Knda" typeface="Tunga"/>
+        <a:font script="Guru" typeface="Raavi"/>
+        <a:font script="Cans" typeface="Euphemia"/>
+        <a:font script="Cher" typeface="Plantagenet Cherokee"/>
+        <a:font script="Yiii" typeface="Microsoft Yi Baiti"/>
+        <a:font script="Tibt" typeface="Microsoft Himalaya"/>
+        <a:font script="Thaa" typeface="MV Boli"/>
+        <a:font script="Deva" typeface="Mangal"/>
+        <a:font script="Telu" typeface="Gautami"/>
+        <a:font script="Taml" typeface="Latha"/>
+        <a:font script="Syrc" typeface="Estrangelo Edessa"/>
+        <a:font script="Orya" typeface="Kalinga"/>
+        <a:font script="Mlym" typeface="Kartika"/>
+        <a:font script="Laoo" typeface="DokChampa"/>
+        <a:font script="Sinh" typeface="Iskoola Pota"/>
+        <a:font script="Mong" typeface="Mongolian Baiti"/>
+        <a:font script="Viet" typeface="Times New Roman"/>
+        <a:font script="Uigh" typeface="Microsoft Uighur"/>
+        <a:font script="Geor" typeface="Sylfaen"/>
+        <a:font script="Armn" typeface="Arial"/>
+        <a:font script="Bugi" typeface="Leelawadee UI"/>
+        <a:font script="Bopo" typeface="Microsoft JhengHei"/>
+        <a:font script="Java" typeface="Javanese Text"/>
+        <a:font script="Lisu" typeface="Segoe UI"/>
+        <a:font script="Mymr" typeface="Myanmar Text"/>
+        <a:font script="Nkoo" typeface="Ebrima"/>
+        <a:font script="Olck" typeface="Nirmala UI"/>
+        <a:font script="Osma" typeface="Ebrima"/>
+        <a:font script="Phag" typeface="Phagspa"/>
+        <a:font script="Syrn" typeface="Estrangelo Edessa"/>
+        <a:font script="Syrj" typeface="Estrangelo Edessa"/>
+        <a:font script="Syre" typeface="Estrangelo Edessa"/>
+        <a:font script="Sora" typeface="Nirmala UI"/>
+        <a:font script="Tale" typeface="Microsoft Tai Le"/>
+        <a:font script="Talu" typeface="Microsoft New Tai Lue"/>
+        <a:font script="Tfng" typeface="Ebrima"/>
+      </a:majorFont>
+      <a:minorFont>
+        <a:latin typeface="等线" panose="020F0502020204030204"/>
+        <a:ea typeface=""/>
+        <a:cs typeface=""/>
+        <a:font script="Jpan" typeface="游ゴシック"/>
+        <a:font script="Hang" typeface="맑은 고딕"/>
+        <a:font script="Hans" typeface="等线"/>
+        <a:font script="Hant" typeface="新細明體"/>
+        <a:font script="Arab" typeface="Arial"/>
+        <a:font script="Hebr" typeface="Arial"/>
+        <a:font script="Thai" typeface="Cordia New"/>
+        <a:font script="Ethi" typeface="Nyala"/>
+        <a:font script="Beng" typeface="Vrinda"/>
+        <a:font script="Gujr" typeface="Shruti"/>
+        <a:font script="Khmr" typeface="DaunPenh"/>
+        <a:font script="Knda" typeface="Tunga"/>
+        <a:font script="Guru" typeface="Raavi"/>
+        <a:font script="Cans" typeface="Euphemia"/>
+        <a:font script="Cher" typeface="Plantagenet Cherokee"/>
+        <a:font script="Yiii" typeface="Microsoft Yi Baiti"/>
+        <a:font script="Tibt" typeface="Microsoft Himalaya"/>
+        <a:font script="Thaa" typeface="MV Boli"/>
+        <a:font script="Deva" typeface="Mangal"/>
+        <a:font script="Telu" typeface="Gautami"/>
+        <a:font script="Taml" typeface="Latha"/>
+        <a:font script="Syrc" typeface="Estrangelo Edessa"/>
+        <a:font script="Orya" typeface="Kalinga"/>
+        <a:font script="Mlym" typeface="Kartika"/>
+        <a:font script="Laoo" typeface="DokChampa"/>
+        <a:font script="Sinh" typeface="Iskoola Pota"/>
+        <a:font script="Mong" typeface="Mongolian Baiti"/>
+        <a:font script="Viet" typeface="Arial"/>
+        <a:font script="Uigh" typeface="Microsoft Uighur"/>
+        <a:font script="Geor" typeface="Sylfaen"/>
+        <a:font script="Armn" typeface="Arial"/>
+        <a:font script="Bugi" typeface="Leelawadee UI"/>
+        <a:font script="Bopo" typeface="Microsoft JhengHei"/>
+        <a:font script="Java" typeface="Javanese Text"/>
+        <a:font script="Lisu" typeface="Segoe UI"/>
+        <a:font script="Mymr" typeface="Myanmar Text"/>
+        <a:font script="Nkoo" typeface="Ebrima"/>
+        <a:font script="Olck" typeface="Nirmala UI"/>
+        <a:font script="Osma" typeface="Ebrima"/>
+        <a:font script="Phag" typeface="Phagspa"/>
+        <a:font script="Syrn" typeface="Estrangelo Edessa"/>
+        <a:font script="Syrj" typeface="Estrangelo Edessa"/>
+        <a:font script="Syre" typeface="Estrangelo Edessa"/>
+        <a:font script="Sora" typeface="Nirmala UI"/>
+        <a:font script="Tale" typeface="Microsoft Tai Le"/>
+        <a:font script="Talu" typeface="Microsoft New Tai Lue"/>
+        <a:font script="Tfng" typeface="Ebrima"/>
+      </a:minorFont>
+    </a:fontScheme>
+    <a:fmtScheme name="Office">
+      <a:fillStyleLst>
+        <a:solidFill>
+          <a:schemeClr val="phClr"/>
+        </a:solidFill>
+        <a:gradFill rotWithShape="1">
+          <a:gsLst>
+            <a:gs pos="0">
+              <a:schemeClr val="phClr">
+                <a:lumMod val="110000"/>
+                <a:satMod val="105000"/>
+                <a:tint val="67000"/>
+              </a:schemeClr>
+            </a:gs>
+            <a:gs pos="50000">
+              <a:schemeClr val="phClr">
+                <a:lumMod val="105000"/>
+                <a:satMod val="103000"/>
+                <a:tint val="73000"/>
+              </a:schemeClr>
+            </a:gs>
+            <a:gs pos="100000">
+              <a:schemeClr val="phClr">
+                <a:lumMod val="105000"/>
+                <a:satMod val="109000"/>
+                <a:tint val="81000"/>
+              </a:schemeClr>
+            </a:gs>
+          </a:gsLst>
+          <a:lin ang="5400000" scaled="0"/>
+        </a:gradFill>
+        <a:gradFill rotWithShape="1">
+          <a:gsLst>
+            <a:gs pos="0">
+              <a:schemeClr val="phClr">
+                <a:satMod val="103000"/>
+                <a:lumMod val="102000"/>
+                <a:tint val="94000"/>
+              </a:schemeClr>
+            </a:gs>
+            <a:gs pos="50000">
+              <a:schemeClr val="phClr">
+                <a:satMod val="110000"/>
+                <a:lumMod val="100000"/>
+                <a:shade val="100000"/>
+              </a:schemeClr>
+            </a:gs>
+            <a:gs pos="100000">
+              <a:schemeClr val="phClr">
+                <a:lumMod val="99000"/>
+                <a:satMod val="120000"/>
+                <a:shade val="78000"/>
+              </a:schemeClr>
+            </a:gs>
+          </a:gsLst>
+          <a:lin ang="5400000" scaled="0"/>
+        </a:gradFill>
+      </a:fillStyleLst>
+      <a:lnStyleLst>
+        <a:ln w="6350" cap="flat" cmpd="sng" algn="ctr">
+          <a:solidFill>
+            <a:schemeClr val="phClr"/>
+          </a:solidFill>
+          <a:prstDash val="solid"/>
+          <a:miter lim="800000"/>
+        </a:ln>
+        <a:ln w="12700" cap="flat" cmpd="sng" algn="ctr">
+          <a:solidFill>
+            <a:schemeClr val="phClr"/>
+          </a:solidFill>
+          <a:prstDash val="solid"/>
+          <a:miter lim="800000"/>
+        </a:ln>
+        <a:ln w="19050" cap="flat" cmpd="sng" algn="ctr">
+          <a:solidFill>
+            <a:schemeClr val="phClr"/>
+          </a:solidFill>
+          <a:prstDash val="solid"/>
+          <a:miter lim="800000"/>
+        </a:ln>
+      </a:lnStyleLst>
+      <a:effectStyleLst>
+        <a:effectStyle>
+          <a:effectLst/>
+        </a:effectStyle>
+        <a:effectStyle>
+          <a:effectLst/>
+        </a:effectStyle>
+        <a:effectStyle>
+          <a:effectLst>
+            <a:outerShdw blurRad="57150" dist="19050" dir="5400000" algn="ctr" rotWithShape="0">
+              <a:srgbClr val="000000">
+                <a:alpha val="63000"/>
+              </a:srgbClr>
+            </a:outerShdw>
+          </a:effectLst>
+        </a:effectStyle>
+      </a:effectStyleLst>
+      <a:bgFillStyleLst>
+        <a:solidFill>
+          <a:schemeClr val="phClr"/>
+        </a:solidFill>
+        <a:solidFill>
+          <a:schemeClr val="phClr">
+            <a:tint val="95000"/>
+            <a:satMod val="170000"/>
+          </a:schemeClr>
+        </a:solidFill>
+        <a:gradFill rotWithShape="1">
+          <a:gsLst>
+            <a:gs pos="0">
+              <a:schemeClr val="phClr">
+                <a:tint val="93000"/>
+                <a:satMod val="150000"/>
+                <a:shade val="98000"/>
+                <a:lumMod val="102000"/>
+              </a:schemeClr>
+            </a:gs>
+            <a:gs pos="50000">
+              <a:schemeClr val="phClr">
+                <a:tint val="98000"/>
+                <a:satMod val="130000"/>
+                <a:shade val="90000"/>
+                <a:lumMod val="103000"/>
+              </a:schemeClr>
+            </a:gs>
+            <a:gs pos="100000">
+              <a:schemeClr val="phClr">
+                <a:shade val="63000"/>
+                <a:satMod val="120000"/>
+              </a:schemeClr>
+            </a:gs>
+          </a:gsLst>
+          <a:lin ang="5400000" scaled="0"/>
+        </a:gradFill>
+      </a:bgFillStyleLst>
+    </a:fmtScheme>
+  </a:themeElements>
+  <a:objectDefaults/>
+  <a:extraClrSchemeLst/>
+  <a:extLst>
+    <a:ext uri="{05A4C25C-085E-4340-85A3-A5531E510DB2}">
+      <thm15:themeFamily xmlns:thm15="http://schemas.microsoft.com/office/thememl/2012/main" name="Office Theme" id="{62F939B6-93AF-4DB8-9C6B-D6C7DFDC589F}" vid="{4A3C46E8-61CC-4603-A589-7422A47A8E4A}"/>
+    </a:ext>
+  </a:extLst>
+</a:theme>
 </file>
</xml_diff>